<commit_message>
more work on ppt
</commit_message>
<xml_diff>
--- a/Documents/Midterm_exam_Presentation.pptx
+++ b/Documents/Midterm_exam_Presentation.pptx
@@ -41906,6 +41906,862 @@
           </a:extLst>
         </p:spPr>
       </p:pic>
+      <p:sp>
+        <p:nvSpPr>
+          <p:cNvPr id="53" name="Freeform 52"/>
+          <p:cNvSpPr/>
+          <p:nvPr/>
+        </p:nvSpPr>
+        <p:spPr bwMode="auto">
+          <a:xfrm rot="168701" flipH="1">
+            <a:off x="6640036" y="3013936"/>
+            <a:ext cx="1396327" cy="291077"/>
+          </a:xfrm>
+          <a:custGeom>
+            <a:avLst/>
+            <a:gdLst>
+              <a:gd name="connsiteX0" fmla="*/ 570997 w 570997"/>
+              <a:gd name="connsiteY0" fmla="*/ 0 h 231774"/>
+              <a:gd name="connsiteX1" fmla="*/ 42359 w 570997"/>
+              <a:gd name="connsiteY1" fmla="*/ 200025 h 231774"/>
+              <a:gd name="connsiteX2" fmla="*/ 70934 w 570997"/>
+              <a:gd name="connsiteY2" fmla="*/ 228600 h 231774"/>
+            </a:gdLst>
+            <a:ahLst/>
+            <a:cxnLst>
+              <a:cxn ang="0">
+                <a:pos x="connsiteX0" y="connsiteY0"/>
+              </a:cxn>
+              <a:cxn ang="0">
+                <a:pos x="connsiteX1" y="connsiteY1"/>
+              </a:cxn>
+              <a:cxn ang="0">
+                <a:pos x="connsiteX2" y="connsiteY2"/>
+              </a:cxn>
+            </a:cxnLst>
+            <a:rect l="l" t="t" r="r" b="b"/>
+            <a:pathLst>
+              <a:path w="570997" h="231774">
+                <a:moveTo>
+                  <a:pt x="570997" y="0"/>
+                </a:moveTo>
+                <a:cubicBezTo>
+                  <a:pt x="348350" y="80962"/>
+                  <a:pt x="125703" y="161925"/>
+                  <a:pt x="42359" y="200025"/>
+                </a:cubicBezTo>
+                <a:cubicBezTo>
+                  <a:pt x="-40985" y="238125"/>
+                  <a:pt x="14974" y="233362"/>
+                  <a:pt x="70934" y="228600"/>
+                </a:cubicBezTo>
+              </a:path>
+            </a:pathLst>
+          </a:custGeom>
+          <a:solidFill>
+            <a:srgbClr val="FF0000"/>
+          </a:solidFill>
+          <a:ln w="38100" cap="flat" cmpd="sng" algn="ctr">
+            <a:solidFill>
+              <a:srgbClr val="FF0000"/>
+            </a:solidFill>
+            <a:prstDash val="solid"/>
+            <a:round/>
+            <a:headEnd type="none" w="med" len="med"/>
+            <a:tailEnd type="triangle" w="lg" len="lg"/>
+          </a:ln>
+          <a:effectLst/>
+          <a:extLst/>
+        </p:spPr>
+        <p:txBody>
+          <a:bodyPr vert="horz" wrap="square" lIns="91440" tIns="45720" rIns="91440" bIns="45720" numCol="1" rtlCol="1" anchor="t" anchorCtr="0" compatLnSpc="1">
+            <a:prstTxWarp prst="textNoShape">
+              <a:avLst/>
+            </a:prstTxWarp>
+          </a:bodyPr>
+          <a:lstStyle/>
+          <a:p>
+            <a:pPr marL="0" marR="0" indent="0" algn="l" defTabSz="914400" rtl="0" eaLnBrk="1" fontAlgn="base" latinLnBrk="0" hangingPunct="1">
+              <a:lnSpc>
+                <a:spcPct val="100000"/>
+              </a:lnSpc>
+              <a:spcBef>
+                <a:spcPct val="0"/>
+              </a:spcBef>
+              <a:spcAft>
+                <a:spcPct val="0"/>
+              </a:spcAft>
+              <a:buClrTx/>
+              <a:buSzTx/>
+              <a:buFontTx/>
+              <a:buNone/>
+              <a:tabLst/>
+            </a:pPr>
+            <a:endParaRPr kumimoji="0" lang="he-IL" sz="2400" b="0" i="0" u="none" strike="noStrike" cap="none" normalizeH="0" baseline="0" smtClean="0">
+              <a:ln>
+                <a:noFill/>
+              </a:ln>
+              <a:solidFill>
+                <a:schemeClr val="tx1"/>
+              </a:solidFill>
+              <a:effectLst/>
+              <a:latin typeface="Arial" pitchFamily="34" charset="0"/>
+            </a:endParaRPr>
+          </a:p>
+        </p:txBody>
+      </p:sp>
+      <p:sp>
+        <p:nvSpPr>
+          <p:cNvPr id="54" name="Rectangle 53"/>
+          <p:cNvSpPr/>
+          <p:nvPr/>
+        </p:nvSpPr>
+        <p:spPr bwMode="auto">
+          <a:xfrm>
+            <a:off x="7092280" y="2845857"/>
+            <a:ext cx="252000" cy="295111"/>
+          </a:xfrm>
+          <a:prstGeom prst="rect">
+            <a:avLst/>
+          </a:prstGeom>
+          <a:solidFill>
+            <a:srgbClr val="92D050">
+              <a:alpha val="27000"/>
+            </a:srgbClr>
+          </a:solidFill>
+          <a:ln w="9525" cap="flat" cmpd="sng" algn="ctr">
+            <a:solidFill>
+              <a:schemeClr val="tx1"/>
+            </a:solidFill>
+            <a:prstDash val="solid"/>
+            <a:round/>
+            <a:headEnd type="none" w="med" len="med"/>
+            <a:tailEnd type="none" w="med" len="med"/>
+          </a:ln>
+          <a:effectLst/>
+          <a:extLst/>
+        </p:spPr>
+        <p:txBody>
+          <a:bodyPr vert="horz" wrap="square" lIns="91440" tIns="45720" rIns="91440" bIns="45720" numCol="1" rtlCol="1" anchor="t" anchorCtr="0" compatLnSpc="1">
+            <a:prstTxWarp prst="textNoShape">
+              <a:avLst/>
+            </a:prstTxWarp>
+          </a:bodyPr>
+          <a:lstStyle/>
+          <a:p>
+            <a:pPr marL="0" marR="0" indent="0" algn="l" defTabSz="914400" rtl="0" eaLnBrk="1" fontAlgn="base" latinLnBrk="0" hangingPunct="1">
+              <a:lnSpc>
+                <a:spcPct val="100000"/>
+              </a:lnSpc>
+              <a:spcBef>
+                <a:spcPct val="0"/>
+              </a:spcBef>
+              <a:spcAft>
+                <a:spcPct val="0"/>
+              </a:spcAft>
+              <a:buClrTx/>
+              <a:buSzTx/>
+              <a:buFontTx/>
+              <a:buNone/>
+              <a:tabLst/>
+            </a:pPr>
+            <a:endParaRPr kumimoji="0" lang="he-IL" sz="1800" b="0" i="0" u="none" strike="noStrike" cap="none" normalizeH="0" baseline="0" smtClean="0">
+              <a:ln>
+                <a:noFill/>
+              </a:ln>
+              <a:solidFill>
+                <a:schemeClr val="tx1"/>
+              </a:solidFill>
+              <a:effectLst/>
+              <a:latin typeface="Arial" pitchFamily="34" charset="0"/>
+            </a:endParaRPr>
+          </a:p>
+        </p:txBody>
+      </p:sp>
+      <p:sp>
+        <p:nvSpPr>
+          <p:cNvPr id="55" name="Freeform 54"/>
+          <p:cNvSpPr/>
+          <p:nvPr/>
+        </p:nvSpPr>
+        <p:spPr bwMode="auto">
+          <a:xfrm rot="168701" flipH="1">
+            <a:off x="8167085" y="3338465"/>
+            <a:ext cx="45719" cy="473097"/>
+          </a:xfrm>
+          <a:custGeom>
+            <a:avLst/>
+            <a:gdLst>
+              <a:gd name="connsiteX0" fmla="*/ 570997 w 570997"/>
+              <a:gd name="connsiteY0" fmla="*/ 0 h 231774"/>
+              <a:gd name="connsiteX1" fmla="*/ 42359 w 570997"/>
+              <a:gd name="connsiteY1" fmla="*/ 200025 h 231774"/>
+              <a:gd name="connsiteX2" fmla="*/ 70934 w 570997"/>
+              <a:gd name="connsiteY2" fmla="*/ 228600 h 231774"/>
+            </a:gdLst>
+            <a:ahLst/>
+            <a:cxnLst>
+              <a:cxn ang="0">
+                <a:pos x="connsiteX0" y="connsiteY0"/>
+              </a:cxn>
+              <a:cxn ang="0">
+                <a:pos x="connsiteX1" y="connsiteY1"/>
+              </a:cxn>
+              <a:cxn ang="0">
+                <a:pos x="connsiteX2" y="connsiteY2"/>
+              </a:cxn>
+            </a:cxnLst>
+            <a:rect l="l" t="t" r="r" b="b"/>
+            <a:pathLst>
+              <a:path w="570997" h="231774">
+                <a:moveTo>
+                  <a:pt x="570997" y="0"/>
+                </a:moveTo>
+                <a:cubicBezTo>
+                  <a:pt x="348350" y="80962"/>
+                  <a:pt x="125703" y="161925"/>
+                  <a:pt x="42359" y="200025"/>
+                </a:cubicBezTo>
+                <a:cubicBezTo>
+                  <a:pt x="-40985" y="238125"/>
+                  <a:pt x="14974" y="233362"/>
+                  <a:pt x="70934" y="228600"/>
+                </a:cubicBezTo>
+              </a:path>
+            </a:pathLst>
+          </a:custGeom>
+          <a:solidFill>
+            <a:srgbClr val="FF0000"/>
+          </a:solidFill>
+          <a:ln w="38100" cap="flat" cmpd="sng" algn="ctr">
+            <a:solidFill>
+              <a:srgbClr val="FF0000"/>
+            </a:solidFill>
+            <a:prstDash val="solid"/>
+            <a:round/>
+            <a:headEnd type="none" w="med" len="med"/>
+            <a:tailEnd type="triangle" w="lg" len="lg"/>
+          </a:ln>
+          <a:effectLst/>
+          <a:extLst/>
+        </p:spPr>
+        <p:txBody>
+          <a:bodyPr vert="horz" wrap="square" lIns="91440" tIns="45720" rIns="91440" bIns="45720" numCol="1" rtlCol="1" anchor="t" anchorCtr="0" compatLnSpc="1">
+            <a:prstTxWarp prst="textNoShape">
+              <a:avLst/>
+            </a:prstTxWarp>
+          </a:bodyPr>
+          <a:lstStyle/>
+          <a:p>
+            <a:pPr marL="0" marR="0" indent="0" algn="l" defTabSz="914400" rtl="0" eaLnBrk="1" fontAlgn="base" latinLnBrk="0" hangingPunct="1">
+              <a:lnSpc>
+                <a:spcPct val="100000"/>
+              </a:lnSpc>
+              <a:spcBef>
+                <a:spcPct val="0"/>
+              </a:spcBef>
+              <a:spcAft>
+                <a:spcPct val="0"/>
+              </a:spcAft>
+              <a:buClrTx/>
+              <a:buSzTx/>
+              <a:buFontTx/>
+              <a:buNone/>
+              <a:tabLst/>
+            </a:pPr>
+            <a:endParaRPr kumimoji="0" lang="he-IL" sz="2400" b="0" i="0" u="none" strike="noStrike" cap="none" normalizeH="0" baseline="0" smtClean="0">
+              <a:ln>
+                <a:noFill/>
+              </a:ln>
+              <a:solidFill>
+                <a:schemeClr val="tx1"/>
+              </a:solidFill>
+              <a:effectLst/>
+              <a:latin typeface="Arial" pitchFamily="34" charset="0"/>
+            </a:endParaRPr>
+          </a:p>
+        </p:txBody>
+      </p:sp>
+      <p:sp>
+        <p:nvSpPr>
+          <p:cNvPr id="56" name="Rectangle 55"/>
+          <p:cNvSpPr/>
+          <p:nvPr/>
+        </p:nvSpPr>
+        <p:spPr bwMode="auto">
+          <a:xfrm>
+            <a:off x="7903509" y="3384750"/>
+            <a:ext cx="252000" cy="295111"/>
+          </a:xfrm>
+          <a:prstGeom prst="rect">
+            <a:avLst/>
+          </a:prstGeom>
+          <a:solidFill>
+            <a:srgbClr val="92D050">
+              <a:alpha val="27000"/>
+            </a:srgbClr>
+          </a:solidFill>
+          <a:ln w="9525" cap="flat" cmpd="sng" algn="ctr">
+            <a:solidFill>
+              <a:schemeClr val="tx1"/>
+            </a:solidFill>
+            <a:prstDash val="solid"/>
+            <a:round/>
+            <a:headEnd type="none" w="med" len="med"/>
+            <a:tailEnd type="none" w="med" len="med"/>
+          </a:ln>
+          <a:effectLst/>
+          <a:extLst/>
+        </p:spPr>
+        <p:txBody>
+          <a:bodyPr vert="horz" wrap="square" lIns="91440" tIns="45720" rIns="91440" bIns="45720" numCol="1" rtlCol="1" anchor="t" anchorCtr="0" compatLnSpc="1">
+            <a:prstTxWarp prst="textNoShape">
+              <a:avLst/>
+            </a:prstTxWarp>
+          </a:bodyPr>
+          <a:lstStyle/>
+          <a:p>
+            <a:pPr marL="0" marR="0" indent="0" algn="l" defTabSz="914400" rtl="0" eaLnBrk="1" fontAlgn="base" latinLnBrk="0" hangingPunct="1">
+              <a:lnSpc>
+                <a:spcPct val="100000"/>
+              </a:lnSpc>
+              <a:spcBef>
+                <a:spcPct val="0"/>
+              </a:spcBef>
+              <a:spcAft>
+                <a:spcPct val="0"/>
+              </a:spcAft>
+              <a:buClrTx/>
+              <a:buSzTx/>
+              <a:buFontTx/>
+              <a:buNone/>
+              <a:tabLst/>
+            </a:pPr>
+            <a:endParaRPr kumimoji="0" lang="he-IL" sz="1800" b="0" i="0" u="none" strike="noStrike" cap="none" normalizeH="0" baseline="0" smtClean="0">
+              <a:ln>
+                <a:noFill/>
+              </a:ln>
+              <a:solidFill>
+                <a:schemeClr val="tx1"/>
+              </a:solidFill>
+              <a:effectLst/>
+              <a:latin typeface="Arial" pitchFamily="34" charset="0"/>
+            </a:endParaRPr>
+          </a:p>
+        </p:txBody>
+      </p:sp>
+      <p:sp>
+        <p:nvSpPr>
+          <p:cNvPr id="57" name="Freeform 56"/>
+          <p:cNvSpPr/>
+          <p:nvPr/>
+        </p:nvSpPr>
+        <p:spPr bwMode="auto">
+          <a:xfrm rot="168701" flipH="1">
+            <a:off x="8188112" y="4035654"/>
+            <a:ext cx="60651" cy="304039"/>
+          </a:xfrm>
+          <a:custGeom>
+            <a:avLst/>
+            <a:gdLst>
+              <a:gd name="connsiteX0" fmla="*/ 570997 w 570997"/>
+              <a:gd name="connsiteY0" fmla="*/ 0 h 231774"/>
+              <a:gd name="connsiteX1" fmla="*/ 42359 w 570997"/>
+              <a:gd name="connsiteY1" fmla="*/ 200025 h 231774"/>
+              <a:gd name="connsiteX2" fmla="*/ 70934 w 570997"/>
+              <a:gd name="connsiteY2" fmla="*/ 228600 h 231774"/>
+            </a:gdLst>
+            <a:ahLst/>
+            <a:cxnLst>
+              <a:cxn ang="0">
+                <a:pos x="connsiteX0" y="connsiteY0"/>
+              </a:cxn>
+              <a:cxn ang="0">
+                <a:pos x="connsiteX1" y="connsiteY1"/>
+              </a:cxn>
+              <a:cxn ang="0">
+                <a:pos x="connsiteX2" y="connsiteY2"/>
+              </a:cxn>
+            </a:cxnLst>
+            <a:rect l="l" t="t" r="r" b="b"/>
+            <a:pathLst>
+              <a:path w="570997" h="231774">
+                <a:moveTo>
+                  <a:pt x="570997" y="0"/>
+                </a:moveTo>
+                <a:cubicBezTo>
+                  <a:pt x="348350" y="80962"/>
+                  <a:pt x="125703" y="161925"/>
+                  <a:pt x="42359" y="200025"/>
+                </a:cubicBezTo>
+                <a:cubicBezTo>
+                  <a:pt x="-40985" y="238125"/>
+                  <a:pt x="14974" y="233362"/>
+                  <a:pt x="70934" y="228600"/>
+                </a:cubicBezTo>
+              </a:path>
+            </a:pathLst>
+          </a:custGeom>
+          <a:solidFill>
+            <a:srgbClr val="FF0000"/>
+          </a:solidFill>
+          <a:ln w="38100" cap="flat" cmpd="sng" algn="ctr">
+            <a:solidFill>
+              <a:srgbClr val="FF0000"/>
+            </a:solidFill>
+            <a:prstDash val="solid"/>
+            <a:round/>
+            <a:headEnd type="none" w="med" len="med"/>
+            <a:tailEnd type="triangle" w="lg" len="lg"/>
+          </a:ln>
+          <a:effectLst/>
+          <a:extLst/>
+        </p:spPr>
+        <p:txBody>
+          <a:bodyPr vert="horz" wrap="square" lIns="91440" tIns="45720" rIns="91440" bIns="45720" numCol="1" rtlCol="1" anchor="t" anchorCtr="0" compatLnSpc="1">
+            <a:prstTxWarp prst="textNoShape">
+              <a:avLst/>
+            </a:prstTxWarp>
+          </a:bodyPr>
+          <a:lstStyle/>
+          <a:p>
+            <a:pPr marL="0" marR="0" indent="0" algn="l" defTabSz="914400" rtl="0" eaLnBrk="1" fontAlgn="base" latinLnBrk="0" hangingPunct="1">
+              <a:lnSpc>
+                <a:spcPct val="100000"/>
+              </a:lnSpc>
+              <a:spcBef>
+                <a:spcPct val="0"/>
+              </a:spcBef>
+              <a:spcAft>
+                <a:spcPct val="0"/>
+              </a:spcAft>
+              <a:buClrTx/>
+              <a:buSzTx/>
+              <a:buFontTx/>
+              <a:buNone/>
+              <a:tabLst/>
+            </a:pPr>
+            <a:endParaRPr kumimoji="0" lang="he-IL" sz="2400" b="0" i="0" u="none" strike="noStrike" cap="none" normalizeH="0" baseline="0" smtClean="0">
+              <a:ln>
+                <a:noFill/>
+              </a:ln>
+              <a:solidFill>
+                <a:schemeClr val="tx1"/>
+              </a:solidFill>
+              <a:effectLst/>
+              <a:latin typeface="Arial" pitchFamily="34" charset="0"/>
+            </a:endParaRPr>
+          </a:p>
+        </p:txBody>
+      </p:sp>
+      <p:sp>
+        <p:nvSpPr>
+          <p:cNvPr id="58" name="Rectangle 57"/>
+          <p:cNvSpPr/>
+          <p:nvPr/>
+        </p:nvSpPr>
+        <p:spPr bwMode="auto">
+          <a:xfrm>
+            <a:off x="7920400" y="3925977"/>
+            <a:ext cx="252000" cy="295111"/>
+          </a:xfrm>
+          <a:prstGeom prst="rect">
+            <a:avLst/>
+          </a:prstGeom>
+          <a:solidFill>
+            <a:srgbClr val="FF0000">
+              <a:alpha val="27000"/>
+            </a:srgbClr>
+          </a:solidFill>
+          <a:ln w="9525" cap="flat" cmpd="sng" algn="ctr">
+            <a:solidFill>
+              <a:schemeClr val="tx1"/>
+            </a:solidFill>
+            <a:prstDash val="solid"/>
+            <a:round/>
+            <a:headEnd type="none" w="med" len="med"/>
+            <a:tailEnd type="none" w="med" len="med"/>
+          </a:ln>
+          <a:effectLst/>
+          <a:extLst/>
+        </p:spPr>
+        <p:txBody>
+          <a:bodyPr vert="horz" wrap="square" lIns="91440" tIns="45720" rIns="91440" bIns="45720" numCol="1" rtlCol="1" anchor="t" anchorCtr="0" compatLnSpc="1">
+            <a:prstTxWarp prst="textNoShape">
+              <a:avLst/>
+            </a:prstTxWarp>
+          </a:bodyPr>
+          <a:lstStyle/>
+          <a:p>
+            <a:pPr marL="0" marR="0" indent="0" algn="l" defTabSz="914400" rtl="0" eaLnBrk="1" fontAlgn="base" latinLnBrk="0" hangingPunct="1">
+              <a:lnSpc>
+                <a:spcPct val="100000"/>
+              </a:lnSpc>
+              <a:spcBef>
+                <a:spcPct val="0"/>
+              </a:spcBef>
+              <a:spcAft>
+                <a:spcPct val="0"/>
+              </a:spcAft>
+              <a:buClrTx/>
+              <a:buSzTx/>
+              <a:buFontTx/>
+              <a:buNone/>
+              <a:tabLst/>
+            </a:pPr>
+            <a:endParaRPr kumimoji="0" lang="he-IL" sz="1800" b="0" i="0" u="none" strike="noStrike" cap="none" normalizeH="0" baseline="0" smtClean="0">
+              <a:ln>
+                <a:noFill/>
+              </a:ln>
+              <a:solidFill>
+                <a:schemeClr val="tx1"/>
+              </a:solidFill>
+              <a:effectLst/>
+              <a:latin typeface="Arial" pitchFamily="34" charset="0"/>
+            </a:endParaRPr>
+          </a:p>
+        </p:txBody>
+      </p:sp>
+      <p:sp>
+        <p:nvSpPr>
+          <p:cNvPr id="59" name="Rectangle 58"/>
+          <p:cNvSpPr/>
+          <p:nvPr/>
+        </p:nvSpPr>
+        <p:spPr bwMode="auto">
+          <a:xfrm>
+            <a:off x="7884368" y="3100896"/>
+            <a:ext cx="504056" cy="256096"/>
+          </a:xfrm>
+          <a:prstGeom prst="rect">
+            <a:avLst/>
+          </a:prstGeom>
+          <a:solidFill>
+            <a:srgbClr val="FFFF00">
+              <a:alpha val="27000"/>
+            </a:srgbClr>
+          </a:solidFill>
+          <a:ln w="9525" cap="flat" cmpd="sng" algn="ctr">
+            <a:solidFill>
+              <a:schemeClr val="tx1"/>
+            </a:solidFill>
+            <a:prstDash val="solid"/>
+            <a:round/>
+            <a:headEnd type="none" w="med" len="med"/>
+            <a:tailEnd type="none" w="med" len="med"/>
+          </a:ln>
+          <a:effectLst/>
+          <a:extLst/>
+        </p:spPr>
+        <p:txBody>
+          <a:bodyPr vert="horz" wrap="square" lIns="91440" tIns="45720" rIns="91440" bIns="45720" numCol="1" rtlCol="1" anchor="t" anchorCtr="0" compatLnSpc="1">
+            <a:prstTxWarp prst="textNoShape">
+              <a:avLst/>
+            </a:prstTxWarp>
+          </a:bodyPr>
+          <a:lstStyle/>
+          <a:p>
+            <a:pPr marL="0" marR="0" indent="0" algn="l" defTabSz="914400" rtl="0" eaLnBrk="1" fontAlgn="base" latinLnBrk="0" hangingPunct="1">
+              <a:lnSpc>
+                <a:spcPct val="100000"/>
+              </a:lnSpc>
+              <a:spcBef>
+                <a:spcPct val="0"/>
+              </a:spcBef>
+              <a:spcAft>
+                <a:spcPct val="0"/>
+              </a:spcAft>
+              <a:buClrTx/>
+              <a:buSzTx/>
+              <a:buFontTx/>
+              <a:buNone/>
+              <a:tabLst/>
+            </a:pPr>
+            <a:endParaRPr kumimoji="0" lang="he-IL" sz="1800" b="0" i="0" u="none" strike="noStrike" cap="none" normalizeH="0" baseline="0" smtClean="0">
+              <a:ln>
+                <a:noFill/>
+              </a:ln>
+              <a:solidFill>
+                <a:schemeClr val="tx1"/>
+              </a:solidFill>
+              <a:effectLst/>
+              <a:latin typeface="Arial" pitchFamily="34" charset="0"/>
+            </a:endParaRPr>
+          </a:p>
+        </p:txBody>
+      </p:sp>
+      <p:sp>
+        <p:nvSpPr>
+          <p:cNvPr id="60" name="Rectangle 59"/>
+          <p:cNvSpPr/>
+          <p:nvPr/>
+        </p:nvSpPr>
+        <p:spPr bwMode="auto">
+          <a:xfrm>
+            <a:off x="395536" y="3933056"/>
+            <a:ext cx="144016" cy="256096"/>
+          </a:xfrm>
+          <a:prstGeom prst="rect">
+            <a:avLst/>
+          </a:prstGeom>
+          <a:solidFill>
+            <a:srgbClr val="FFFF00">
+              <a:alpha val="27000"/>
+            </a:srgbClr>
+          </a:solidFill>
+          <a:ln w="9525" cap="flat" cmpd="sng" algn="ctr">
+            <a:solidFill>
+              <a:schemeClr val="tx1"/>
+            </a:solidFill>
+            <a:prstDash val="solid"/>
+            <a:round/>
+            <a:headEnd type="none" w="med" len="med"/>
+            <a:tailEnd type="none" w="med" len="med"/>
+          </a:ln>
+          <a:effectLst/>
+          <a:extLst/>
+        </p:spPr>
+        <p:txBody>
+          <a:bodyPr vert="horz" wrap="square" lIns="91440" tIns="45720" rIns="91440" bIns="45720" numCol="1" rtlCol="1" anchor="t" anchorCtr="0" compatLnSpc="1">
+            <a:prstTxWarp prst="textNoShape">
+              <a:avLst/>
+            </a:prstTxWarp>
+          </a:bodyPr>
+          <a:lstStyle/>
+          <a:p>
+            <a:pPr marL="0" marR="0" indent="0" algn="l" defTabSz="914400" rtl="0" eaLnBrk="1" fontAlgn="base" latinLnBrk="0" hangingPunct="1">
+              <a:lnSpc>
+                <a:spcPct val="100000"/>
+              </a:lnSpc>
+              <a:spcBef>
+                <a:spcPct val="0"/>
+              </a:spcBef>
+              <a:spcAft>
+                <a:spcPct val="0"/>
+              </a:spcAft>
+              <a:buClrTx/>
+              <a:buSzTx/>
+              <a:buFontTx/>
+              <a:buNone/>
+              <a:tabLst/>
+            </a:pPr>
+            <a:endParaRPr kumimoji="0" lang="he-IL" sz="1800" b="0" i="0" u="none" strike="noStrike" cap="none" normalizeH="0" baseline="0" smtClean="0">
+              <a:ln>
+                <a:noFill/>
+              </a:ln>
+              <a:solidFill>
+                <a:schemeClr val="tx1"/>
+              </a:solidFill>
+              <a:effectLst/>
+              <a:latin typeface="Arial" pitchFamily="34" charset="0"/>
+            </a:endParaRPr>
+          </a:p>
+        </p:txBody>
+      </p:sp>
+      <p:sp>
+        <p:nvSpPr>
+          <p:cNvPr id="61" name="Rectangle 60"/>
+          <p:cNvSpPr/>
+          <p:nvPr/>
+        </p:nvSpPr>
+        <p:spPr bwMode="auto">
+          <a:xfrm>
+            <a:off x="7884368" y="3717032"/>
+            <a:ext cx="504056" cy="256096"/>
+          </a:xfrm>
+          <a:prstGeom prst="rect">
+            <a:avLst/>
+          </a:prstGeom>
+          <a:solidFill>
+            <a:srgbClr val="FFFF00">
+              <a:alpha val="27000"/>
+            </a:srgbClr>
+          </a:solidFill>
+          <a:ln w="9525" cap="flat" cmpd="sng" algn="ctr">
+            <a:solidFill>
+              <a:schemeClr val="tx1"/>
+            </a:solidFill>
+            <a:prstDash val="solid"/>
+            <a:round/>
+            <a:headEnd type="none" w="med" len="med"/>
+            <a:tailEnd type="none" w="med" len="med"/>
+          </a:ln>
+          <a:effectLst/>
+          <a:extLst/>
+        </p:spPr>
+        <p:txBody>
+          <a:bodyPr vert="horz" wrap="square" lIns="91440" tIns="45720" rIns="91440" bIns="45720" numCol="1" rtlCol="1" anchor="t" anchorCtr="0" compatLnSpc="1">
+            <a:prstTxWarp prst="textNoShape">
+              <a:avLst/>
+            </a:prstTxWarp>
+          </a:bodyPr>
+          <a:lstStyle/>
+          <a:p>
+            <a:pPr marL="0" marR="0" indent="0" algn="l" defTabSz="914400" rtl="0" eaLnBrk="1" fontAlgn="base" latinLnBrk="0" hangingPunct="1">
+              <a:lnSpc>
+                <a:spcPct val="100000"/>
+              </a:lnSpc>
+              <a:spcBef>
+                <a:spcPct val="0"/>
+              </a:spcBef>
+              <a:spcAft>
+                <a:spcPct val="0"/>
+              </a:spcAft>
+              <a:buClrTx/>
+              <a:buSzTx/>
+              <a:buFontTx/>
+              <a:buNone/>
+              <a:tabLst/>
+            </a:pPr>
+            <a:endParaRPr kumimoji="0" lang="he-IL" sz="1800" b="0" i="0" u="none" strike="noStrike" cap="none" normalizeH="0" baseline="0" smtClean="0">
+              <a:ln>
+                <a:noFill/>
+              </a:ln>
+              <a:solidFill>
+                <a:schemeClr val="tx1"/>
+              </a:solidFill>
+              <a:effectLst/>
+              <a:latin typeface="Arial" pitchFamily="34" charset="0"/>
+            </a:endParaRPr>
+          </a:p>
+        </p:txBody>
+      </p:sp>
+      <p:sp>
+        <p:nvSpPr>
+          <p:cNvPr id="62" name="Rectangle 61"/>
+          <p:cNvSpPr/>
+          <p:nvPr/>
+        </p:nvSpPr>
+        <p:spPr bwMode="auto">
+          <a:xfrm>
+            <a:off x="395536" y="4541056"/>
+            <a:ext cx="144016" cy="256096"/>
+          </a:xfrm>
+          <a:prstGeom prst="rect">
+            <a:avLst/>
+          </a:prstGeom>
+          <a:solidFill>
+            <a:srgbClr val="FFFF00">
+              <a:alpha val="27000"/>
+            </a:srgbClr>
+          </a:solidFill>
+          <a:ln w="9525" cap="flat" cmpd="sng" algn="ctr">
+            <a:solidFill>
+              <a:schemeClr val="tx1"/>
+            </a:solidFill>
+            <a:prstDash val="solid"/>
+            <a:round/>
+            <a:headEnd type="none" w="med" len="med"/>
+            <a:tailEnd type="none" w="med" len="med"/>
+          </a:ln>
+          <a:effectLst/>
+          <a:extLst/>
+        </p:spPr>
+        <p:txBody>
+          <a:bodyPr vert="horz" wrap="square" lIns="91440" tIns="45720" rIns="91440" bIns="45720" numCol="1" rtlCol="1" anchor="t" anchorCtr="0" compatLnSpc="1">
+            <a:prstTxWarp prst="textNoShape">
+              <a:avLst/>
+            </a:prstTxWarp>
+          </a:bodyPr>
+          <a:lstStyle/>
+          <a:p>
+            <a:pPr marL="0" marR="0" indent="0" algn="l" defTabSz="914400" rtl="0" eaLnBrk="1" fontAlgn="base" latinLnBrk="0" hangingPunct="1">
+              <a:lnSpc>
+                <a:spcPct val="100000"/>
+              </a:lnSpc>
+              <a:spcBef>
+                <a:spcPct val="0"/>
+              </a:spcBef>
+              <a:spcAft>
+                <a:spcPct val="0"/>
+              </a:spcAft>
+              <a:buClrTx/>
+              <a:buSzTx/>
+              <a:buFontTx/>
+              <a:buNone/>
+              <a:tabLst/>
+            </a:pPr>
+            <a:endParaRPr kumimoji="0" lang="he-IL" sz="1800" b="0" i="0" u="none" strike="noStrike" cap="none" normalizeH="0" baseline="0" smtClean="0">
+              <a:ln>
+                <a:noFill/>
+              </a:ln>
+              <a:solidFill>
+                <a:schemeClr val="tx1"/>
+              </a:solidFill>
+              <a:effectLst/>
+              <a:latin typeface="Arial" pitchFamily="34" charset="0"/>
+            </a:endParaRPr>
+          </a:p>
+        </p:txBody>
+      </p:sp>
+      <p:sp>
+        <p:nvSpPr>
+          <p:cNvPr id="63" name="Rectangle 62"/>
+          <p:cNvSpPr/>
+          <p:nvPr/>
+        </p:nvSpPr>
+        <p:spPr bwMode="auto">
+          <a:xfrm>
+            <a:off x="1003648" y="3925757"/>
+            <a:ext cx="183976" cy="261915"/>
+          </a:xfrm>
+          <a:prstGeom prst="rect">
+            <a:avLst/>
+          </a:prstGeom>
+          <a:solidFill>
+            <a:srgbClr val="FF0000">
+              <a:alpha val="27000"/>
+            </a:srgbClr>
+          </a:solidFill>
+          <a:ln w="9525" cap="flat" cmpd="sng" algn="ctr">
+            <a:solidFill>
+              <a:schemeClr val="tx1"/>
+            </a:solidFill>
+            <a:prstDash val="solid"/>
+            <a:round/>
+            <a:headEnd type="none" w="med" len="med"/>
+            <a:tailEnd type="none" w="med" len="med"/>
+          </a:ln>
+          <a:effectLst/>
+          <a:extLst/>
+        </p:spPr>
+        <p:txBody>
+          <a:bodyPr vert="horz" wrap="square" lIns="91440" tIns="45720" rIns="91440" bIns="45720" numCol="1" rtlCol="1" anchor="t" anchorCtr="0" compatLnSpc="1">
+            <a:prstTxWarp prst="textNoShape">
+              <a:avLst/>
+            </a:prstTxWarp>
+          </a:bodyPr>
+          <a:lstStyle/>
+          <a:p>
+            <a:pPr marL="0" marR="0" indent="0" algn="l" defTabSz="914400" rtl="0" eaLnBrk="1" fontAlgn="base" latinLnBrk="0" hangingPunct="1">
+              <a:lnSpc>
+                <a:spcPct val="100000"/>
+              </a:lnSpc>
+              <a:spcBef>
+                <a:spcPct val="0"/>
+              </a:spcBef>
+              <a:spcAft>
+                <a:spcPct val="0"/>
+              </a:spcAft>
+              <a:buClrTx/>
+              <a:buSzTx/>
+              <a:buFontTx/>
+              <a:buNone/>
+              <a:tabLst/>
+            </a:pPr>
+            <a:endParaRPr kumimoji="0" lang="he-IL" sz="1800" b="0" i="0" u="none" strike="noStrike" cap="none" normalizeH="0" baseline="0" smtClean="0">
+              <a:ln>
+                <a:noFill/>
+              </a:ln>
+              <a:solidFill>
+                <a:schemeClr val="tx1"/>
+              </a:solidFill>
+              <a:effectLst/>
+              <a:latin typeface="Arial" pitchFamily="34" charset="0"/>
+            </a:endParaRPr>
+          </a:p>
+        </p:txBody>
+      </p:sp>
     </p:spTree>
     <p:extLst>
       <p:ext uri="{BB962C8B-B14F-4D97-AF65-F5344CB8AC3E}">
@@ -43357,50 +44213,33 @@
                                   </p:childTnLst>
                                 </p:cTn>
                               </p:par>
+                            </p:childTnLst>
+                          </p:cTn>
+                        </p:par>
+                      </p:childTnLst>
+                    </p:cTn>
+                  </p:par>
+                  <p:par>
+                    <p:cTn id="112" fill="hold">
+                      <p:stCondLst>
+                        <p:cond delay="indefinite"/>
+                      </p:stCondLst>
+                      <p:childTnLst>
+                        <p:par>
+                          <p:cTn id="113" fill="hold">
+                            <p:stCondLst>
+                              <p:cond delay="0"/>
+                            </p:stCondLst>
+                            <p:childTnLst>
                               <p:par>
-                                <p:cTn id="112" presetID="10" presetClass="exit" presetSubtype="0" fill="hold" grpId="1" nodeType="withEffect">
+                                <p:cTn id="114" presetID="10" presetClass="exit" presetSubtype="0" fill="hold" grpId="1" nodeType="clickEffect">
                                   <p:stCondLst>
                                     <p:cond delay="0"/>
                                   </p:stCondLst>
                                   <p:childTnLst>
                                     <p:animEffect transition="out" filter="fade">
                                       <p:cBhvr>
-                                        <p:cTn id="113" dur="500"/>
-                                        <p:tgtEl>
-                                          <p:spTgt spid="31"/>
-                                        </p:tgtEl>
-                                      </p:cBhvr>
-                                    </p:animEffect>
-                                    <p:set>
-                                      <p:cBhvr>
-                                        <p:cTn id="114" dur="1" fill="hold">
-                                          <p:stCondLst>
-                                            <p:cond delay="499"/>
-                                          </p:stCondLst>
-                                        </p:cTn>
-                                        <p:tgtEl>
-                                          <p:spTgt spid="31"/>
-                                        </p:tgtEl>
-                                        <p:attrNameLst>
-                                          <p:attrName>style.visibility</p:attrName>
-                                        </p:attrNameLst>
-                                      </p:cBhvr>
-                                      <p:to>
-                                        <p:strVal val="hidden"/>
-                                      </p:to>
-                                    </p:set>
-                                  </p:childTnLst>
-                                </p:cTn>
-                              </p:par>
-                              <p:par>
-                                <p:cTn id="115" presetID="10" presetClass="exit" presetSubtype="0" fill="hold" grpId="1" nodeType="withEffect">
-                                  <p:stCondLst>
-                                    <p:cond delay="0"/>
-                                  </p:stCondLst>
-                                  <p:childTnLst>
-                                    <p:animEffect transition="out" filter="fade">
-                                      <p:cBhvr>
-                                        <p:cTn id="116" dur="500"/>
+                                        <p:cTn id="115" dur="500"/>
                                         <p:tgtEl>
                                           <p:spTgt spid="32"/>
                                         </p:tgtEl>
@@ -43408,7 +44247,7 @@
                                     </p:animEffect>
                                     <p:set>
                                       <p:cBhvr>
-                                        <p:cTn id="117" dur="1" fill="hold">
+                                        <p:cTn id="116" dur="1" fill="hold">
                                           <p:stCondLst>
                                             <p:cond delay="499"/>
                                           </p:stCondLst>
@@ -43428,14 +44267,14 @@
                                 </p:cTn>
                               </p:par>
                               <p:par>
-                                <p:cTn id="118" presetID="10" presetClass="exit" presetSubtype="0" fill="hold" grpId="1" nodeType="withEffect">
+                                <p:cTn id="117" presetID="10" presetClass="exit" presetSubtype="0" fill="hold" grpId="1" nodeType="withEffect">
                                   <p:stCondLst>
                                     <p:cond delay="0"/>
                                   </p:stCondLst>
                                   <p:childTnLst>
                                     <p:animEffect transition="out" filter="fade">
                                       <p:cBhvr>
-                                        <p:cTn id="119" dur="500"/>
+                                        <p:cTn id="118" dur="500"/>
                                         <p:tgtEl>
                                           <p:spTgt spid="33"/>
                                         </p:tgtEl>
@@ -43443,7 +44282,7 @@
                                     </p:animEffect>
                                     <p:set>
                                       <p:cBhvr>
-                                        <p:cTn id="120" dur="1" fill="hold">
+                                        <p:cTn id="119" dur="1" fill="hold">
                                           <p:stCondLst>
                                             <p:cond delay="499"/>
                                           </p:stCondLst>
@@ -43463,14 +44302,14 @@
                                 </p:cTn>
                               </p:par>
                               <p:par>
-                                <p:cTn id="121" presetID="10" presetClass="exit" presetSubtype="0" fill="hold" grpId="1" nodeType="withEffect">
+                                <p:cTn id="120" presetID="10" presetClass="exit" presetSubtype="0" fill="hold" grpId="1" nodeType="withEffect">
                                   <p:stCondLst>
                                     <p:cond delay="0"/>
                                   </p:stCondLst>
                                   <p:childTnLst>
                                     <p:animEffect transition="out" filter="fade">
                                       <p:cBhvr>
-                                        <p:cTn id="122" dur="500"/>
+                                        <p:cTn id="121" dur="500"/>
                                         <p:tgtEl>
                                           <p:spTgt spid="34"/>
                                         </p:tgtEl>
@@ -43478,7 +44317,7 @@
                                     </p:animEffect>
                                     <p:set>
                                       <p:cBhvr>
-                                        <p:cTn id="123" dur="1" fill="hold">
+                                        <p:cTn id="122" dur="1" fill="hold">
                                           <p:stCondLst>
                                             <p:cond delay="499"/>
                                           </p:stCondLst>
@@ -43498,14 +44337,14 @@
                                 </p:cTn>
                               </p:par>
                               <p:par>
-                                <p:cTn id="124" presetID="10" presetClass="exit" presetSubtype="0" fill="hold" nodeType="withEffect">
+                                <p:cTn id="123" presetID="10" presetClass="exit" presetSubtype="0" fill="hold" nodeType="withEffect">
                                   <p:stCondLst>
                                     <p:cond delay="0"/>
                                   </p:stCondLst>
                                   <p:childTnLst>
                                     <p:animEffect transition="out" filter="fade">
                                       <p:cBhvr>
-                                        <p:cTn id="125" dur="500"/>
+                                        <p:cTn id="124" dur="500"/>
                                         <p:tgtEl>
                                           <p:spTgt spid="35"/>
                                         </p:tgtEl>
@@ -43513,7 +44352,7 @@
                                     </p:animEffect>
                                     <p:set>
                                       <p:cBhvr>
-                                        <p:cTn id="126" dur="1" fill="hold">
+                                        <p:cTn id="125" dur="1" fill="hold">
                                           <p:stCondLst>
                                             <p:cond delay="499"/>
                                           </p:stCondLst>
@@ -43539,26 +44378,26 @@
                     </p:cTn>
                   </p:par>
                   <p:par>
-                    <p:cTn id="127" fill="hold">
+                    <p:cTn id="126" fill="hold">
                       <p:stCondLst>
                         <p:cond delay="indefinite"/>
                       </p:stCondLst>
                       <p:childTnLst>
                         <p:par>
-                          <p:cTn id="128" fill="hold">
+                          <p:cTn id="127" fill="hold">
                             <p:stCondLst>
                               <p:cond delay="0"/>
                             </p:stCondLst>
                             <p:childTnLst>
                               <p:par>
-                                <p:cTn id="129" presetID="1" presetClass="entr" presetSubtype="0" fill="hold" grpId="0" nodeType="clickEffect">
+                                <p:cTn id="128" presetID="1" presetClass="entr" presetSubtype="0" fill="hold" grpId="0" nodeType="clickEffect">
                                   <p:stCondLst>
                                     <p:cond delay="0"/>
                                   </p:stCondLst>
                                   <p:childTnLst>
                                     <p:set>
                                       <p:cBhvr>
-                                        <p:cTn id="130" dur="1" fill="hold">
+                                        <p:cTn id="129" dur="1" fill="hold">
                                           <p:stCondLst>
                                             <p:cond delay="0"/>
                                           </p:stCondLst>
@@ -43584,26 +44423,26 @@
                     </p:cTn>
                   </p:par>
                   <p:par>
-                    <p:cTn id="131" fill="hold">
+                    <p:cTn id="130" fill="hold">
                       <p:stCondLst>
                         <p:cond delay="indefinite"/>
                       </p:stCondLst>
                       <p:childTnLst>
                         <p:par>
-                          <p:cTn id="132" fill="hold">
+                          <p:cTn id="131" fill="hold">
                             <p:stCondLst>
                               <p:cond delay="0"/>
                             </p:stCondLst>
                             <p:childTnLst>
                               <p:par>
-                                <p:cTn id="133" presetID="1" presetClass="entr" presetSubtype="0" fill="hold" grpId="0" nodeType="clickEffect">
+                                <p:cTn id="132" presetID="1" presetClass="entr" presetSubtype="0" fill="hold" grpId="0" nodeType="clickEffect">
                                   <p:stCondLst>
                                     <p:cond delay="0"/>
                                   </p:stCondLst>
                                   <p:childTnLst>
                                     <p:set>
                                       <p:cBhvr>
-                                        <p:cTn id="134" dur="1" fill="hold">
+                                        <p:cTn id="133" dur="1" fill="hold">
                                           <p:stCondLst>
                                             <p:cond delay="0"/>
                                           </p:stCondLst>
@@ -43623,49 +44462,14 @@
                                 </p:cTn>
                               </p:par>
                               <p:par>
-                                <p:cTn id="135" presetID="10" presetClass="exit" presetSubtype="0" fill="hold" grpId="1" nodeType="withEffect">
-                                  <p:stCondLst>
-                                    <p:cond delay="0"/>
-                                  </p:stCondLst>
-                                  <p:childTnLst>
-                                    <p:animEffect transition="out" filter="fade">
-                                      <p:cBhvr>
-                                        <p:cTn id="136" dur="500"/>
-                                        <p:tgtEl>
-                                          <p:spTgt spid="46"/>
-                                        </p:tgtEl>
-                                      </p:cBhvr>
-                                    </p:animEffect>
-                                    <p:set>
-                                      <p:cBhvr>
-                                        <p:cTn id="137" dur="1" fill="hold">
-                                          <p:stCondLst>
-                                            <p:cond delay="499"/>
-                                          </p:stCondLst>
-                                        </p:cTn>
-                                        <p:tgtEl>
-                                          <p:spTgt spid="46"/>
-                                        </p:tgtEl>
-                                        <p:attrNameLst>
-                                          <p:attrName>style.visibility</p:attrName>
-                                        </p:attrNameLst>
-                                      </p:cBhvr>
-                                      <p:to>
-                                        <p:strVal val="hidden"/>
-                                      </p:to>
-                                    </p:set>
-                                  </p:childTnLst>
-                                </p:cTn>
-                              </p:par>
-                              <p:par>
-                                <p:cTn id="138" presetID="1" presetClass="entr" presetSubtype="0" fill="hold" grpId="0" nodeType="withEffect">
+                                <p:cTn id="134" presetID="1" presetClass="entr" presetSubtype="0" fill="hold" grpId="0" nodeType="withEffect">
                                   <p:stCondLst>
                                     <p:cond delay="0"/>
                                   </p:stCondLst>
                                   <p:childTnLst>
                                     <p:set>
                                       <p:cBhvr>
-                                        <p:cTn id="139" dur="1" fill="hold">
+                                        <p:cTn id="135" dur="1" fill="hold">
                                           <p:stCondLst>
                                             <p:cond delay="0"/>
                                           </p:stCondLst>
@@ -43701,14 +44505,14 @@
                                 </p:cTn>
                               </p:par>
                               <p:par>
-                                <p:cTn id="140" presetID="1" presetClass="entr" presetSubtype="0" fill="hold" grpId="0" nodeType="withEffect">
+                                <p:cTn id="136" presetID="1" presetClass="entr" presetSubtype="0" fill="hold" grpId="0" nodeType="withEffect">
                                   <p:stCondLst>
                                     <p:cond delay="0"/>
                                   </p:stCondLst>
                                   <p:childTnLst>
                                     <p:set>
                                       <p:cBhvr>
-                                        <p:cTn id="141" dur="1" fill="hold">
+                                        <p:cTn id="137" dur="1" fill="hold">
                                           <p:stCondLst>
                                             <p:cond delay="0"/>
                                           </p:stCondLst>
@@ -43744,14 +44548,14 @@
                                 </p:cTn>
                               </p:par>
                               <p:par>
-                                <p:cTn id="142" presetID="1" presetClass="entr" presetSubtype="0" fill="hold" grpId="0" nodeType="withEffect">
+                                <p:cTn id="138" presetID="1" presetClass="entr" presetSubtype="0" fill="hold" grpId="0" nodeType="withEffect">
                                   <p:stCondLst>
                                     <p:cond delay="0"/>
                                   </p:stCondLst>
                                   <p:childTnLst>
                                     <p:set>
                                       <p:cBhvr>
-                                        <p:cTn id="143" dur="1" fill="hold">
+                                        <p:cTn id="139" dur="1" fill="hold">
                                           <p:stCondLst>
                                             <p:cond delay="0"/>
                                           </p:stCondLst>
@@ -43786,41 +44590,6 @@
                                   </p:subTnLst>
                                 </p:cTn>
                               </p:par>
-                              <p:par>
-                                <p:cTn id="144" presetID="10" presetClass="exit" presetSubtype="0" fill="hold" grpId="1" nodeType="withEffect">
-                                  <p:stCondLst>
-                                    <p:cond delay="0"/>
-                                  </p:stCondLst>
-                                  <p:childTnLst>
-                                    <p:animEffect transition="out" filter="fade">
-                                      <p:cBhvr>
-                                        <p:cTn id="145" dur="500"/>
-                                        <p:tgtEl>
-                                          <p:spTgt spid="49"/>
-                                        </p:tgtEl>
-                                      </p:cBhvr>
-                                    </p:animEffect>
-                                    <p:set>
-                                      <p:cBhvr>
-                                        <p:cTn id="146" dur="1" fill="hold">
-                                          <p:stCondLst>
-                                            <p:cond delay="499"/>
-                                          </p:stCondLst>
-                                        </p:cTn>
-                                        <p:tgtEl>
-                                          <p:spTgt spid="49"/>
-                                        </p:tgtEl>
-                                        <p:attrNameLst>
-                                          <p:attrName>style.visibility</p:attrName>
-                                        </p:attrNameLst>
-                                      </p:cBhvr>
-                                      <p:to>
-                                        <p:strVal val="hidden"/>
-                                      </p:to>
-                                    </p:set>
-                                  </p:childTnLst>
-                                </p:cTn>
-                              </p:par>
                             </p:childTnLst>
                           </p:cTn>
                         </p:par>
@@ -43828,26 +44597,26 @@
                     </p:cTn>
                   </p:par>
                   <p:par>
-                    <p:cTn id="147" fill="hold">
+                    <p:cTn id="140" fill="hold">
                       <p:stCondLst>
                         <p:cond delay="indefinite"/>
                       </p:stCondLst>
                       <p:childTnLst>
                         <p:par>
-                          <p:cTn id="148" fill="hold">
+                          <p:cTn id="141" fill="hold">
                             <p:stCondLst>
                               <p:cond delay="0"/>
                             </p:stCondLst>
                             <p:childTnLst>
                               <p:par>
-                                <p:cTn id="149" presetID="1" presetClass="entr" presetSubtype="0" fill="hold" grpId="0" nodeType="clickEffect">
+                                <p:cTn id="142" presetID="1" presetClass="entr" presetSubtype="0" fill="hold" grpId="0" nodeType="clickEffect">
                                   <p:stCondLst>
                                     <p:cond delay="0"/>
                                   </p:stCondLst>
                                   <p:childTnLst>
                                     <p:set>
                                       <p:cBhvr>
-                                        <p:cTn id="150" dur="1" fill="hold">
+                                        <p:cTn id="143" dur="1" fill="hold">
                                           <p:stCondLst>
                                             <p:cond delay="0"/>
                                           </p:stCondLst>
@@ -43873,26 +44642,343 @@
                     </p:cTn>
                   </p:par>
                   <p:par>
-                    <p:cTn id="151" fill="hold">
+                    <p:cTn id="144" fill="hold">
                       <p:stCondLst>
                         <p:cond delay="indefinite"/>
                       </p:stCondLst>
                       <p:childTnLst>
                         <p:par>
-                          <p:cTn id="152" fill="hold">
+                          <p:cTn id="145" fill="hold">
                             <p:stCondLst>
                               <p:cond delay="0"/>
                             </p:stCondLst>
                             <p:childTnLst>
                               <p:par>
-                                <p:cTn id="153" presetID="10" presetClass="exit" presetSubtype="0" fill="hold" grpId="1" nodeType="clickEffect">
+                                <p:cTn id="146" presetID="1" presetClass="entr" presetSubtype="0" fill="hold" grpId="0" nodeType="clickEffect">
+                                  <p:stCondLst>
+                                    <p:cond delay="0"/>
+                                  </p:stCondLst>
+                                  <p:childTnLst>
+                                    <p:set>
+                                      <p:cBhvr>
+                                        <p:cTn id="147" dur="1" fill="hold">
+                                          <p:stCondLst>
+                                            <p:cond delay="0"/>
+                                          </p:stCondLst>
+                                        </p:cTn>
+                                        <p:tgtEl>
+                                          <p:spTgt spid="51"/>
+                                        </p:tgtEl>
+                                        <p:attrNameLst>
+                                          <p:attrName>style.visibility</p:attrName>
+                                        </p:attrNameLst>
+                                      </p:cBhvr>
+                                      <p:to>
+                                        <p:strVal val="visible"/>
+                                      </p:to>
+                                    </p:set>
+                                  </p:childTnLst>
+                                </p:cTn>
+                              </p:par>
+                              <p:par>
+                                <p:cTn id="148" presetID="1" presetClass="entr" presetSubtype="0" fill="hold" nodeType="withEffect">
+                                  <p:stCondLst>
+                                    <p:cond delay="0"/>
+                                  </p:stCondLst>
+                                  <p:childTnLst>
+                                    <p:set>
+                                      <p:cBhvr>
+                                        <p:cTn id="149" dur="1" fill="hold">
+                                          <p:stCondLst>
+                                            <p:cond delay="0"/>
+                                          </p:stCondLst>
+                                        </p:cTn>
+                                        <p:tgtEl>
+                                          <p:spTgt spid="52"/>
+                                        </p:tgtEl>
+                                        <p:attrNameLst>
+                                          <p:attrName>style.visibility</p:attrName>
+                                        </p:attrNameLst>
+                                      </p:cBhvr>
+                                      <p:to>
+                                        <p:strVal val="visible"/>
+                                      </p:to>
+                                    </p:set>
+                                  </p:childTnLst>
+                                </p:cTn>
+                              </p:par>
+                            </p:childTnLst>
+                          </p:cTn>
+                        </p:par>
+                      </p:childTnLst>
+                    </p:cTn>
+                  </p:par>
+                  <p:par>
+                    <p:cTn id="150" fill="hold">
+                      <p:stCondLst>
+                        <p:cond delay="indefinite"/>
+                      </p:stCondLst>
+                      <p:childTnLst>
+                        <p:par>
+                          <p:cTn id="151" fill="hold">
+                            <p:stCondLst>
+                              <p:cond delay="0"/>
+                            </p:stCondLst>
+                            <p:childTnLst>
+                              <p:par>
+                                <p:cTn id="152" presetID="10" presetClass="exit" presetSubtype="0" fill="hold" nodeType="clickEffect">
                                   <p:stCondLst>
                                     <p:cond delay="0"/>
                                   </p:stCondLst>
                                   <p:childTnLst>
                                     <p:animEffect transition="out" filter="fade">
                                       <p:cBhvr>
-                                        <p:cTn id="154" dur="500"/>
+                                        <p:cTn id="153" dur="500"/>
+                                        <p:tgtEl>
+                                          <p:spTgt spid="52"/>
+                                        </p:tgtEl>
+                                      </p:cBhvr>
+                                    </p:animEffect>
+                                    <p:set>
+                                      <p:cBhvr>
+                                        <p:cTn id="154" dur="1" fill="hold">
+                                          <p:stCondLst>
+                                            <p:cond delay="499"/>
+                                          </p:stCondLst>
+                                        </p:cTn>
+                                        <p:tgtEl>
+                                          <p:spTgt spid="52"/>
+                                        </p:tgtEl>
+                                        <p:attrNameLst>
+                                          <p:attrName>style.visibility</p:attrName>
+                                        </p:attrNameLst>
+                                      </p:cBhvr>
+                                      <p:to>
+                                        <p:strVal val="hidden"/>
+                                      </p:to>
+                                    </p:set>
+                                  </p:childTnLst>
+                                </p:cTn>
+                              </p:par>
+                              <p:par>
+                                <p:cTn id="155" presetID="10" presetClass="exit" presetSubtype="0" fill="hold" grpId="1" nodeType="withEffect">
+                                  <p:stCondLst>
+                                    <p:cond delay="0"/>
+                                  </p:stCondLst>
+                                  <p:childTnLst>
+                                    <p:animEffect transition="out" filter="fade">
+                                      <p:cBhvr>
+                                        <p:cTn id="156" dur="500"/>
+                                        <p:tgtEl>
+                                          <p:spTgt spid="30"/>
+                                        </p:tgtEl>
+                                      </p:cBhvr>
+                                    </p:animEffect>
+                                    <p:set>
+                                      <p:cBhvr>
+                                        <p:cTn id="157" dur="1" fill="hold">
+                                          <p:stCondLst>
+                                            <p:cond delay="499"/>
+                                          </p:stCondLst>
+                                        </p:cTn>
+                                        <p:tgtEl>
+                                          <p:spTgt spid="30"/>
+                                        </p:tgtEl>
+                                        <p:attrNameLst>
+                                          <p:attrName>style.visibility</p:attrName>
+                                        </p:attrNameLst>
+                                      </p:cBhvr>
+                                      <p:to>
+                                        <p:strVal val="hidden"/>
+                                      </p:to>
+                                    </p:set>
+                                  </p:childTnLst>
+                                </p:cTn>
+                              </p:par>
+                              <p:par>
+                                <p:cTn id="158" presetID="10" presetClass="exit" presetSubtype="0" fill="hold" grpId="1" nodeType="withEffect">
+                                  <p:stCondLst>
+                                    <p:cond delay="0"/>
+                                  </p:stCondLst>
+                                  <p:childTnLst>
+                                    <p:animEffect transition="out" filter="fade">
+                                      <p:cBhvr>
+                                        <p:cTn id="159" dur="500"/>
+                                        <p:tgtEl>
+                                          <p:spTgt spid="43"/>
+                                        </p:tgtEl>
+                                      </p:cBhvr>
+                                    </p:animEffect>
+                                    <p:set>
+                                      <p:cBhvr>
+                                        <p:cTn id="160" dur="1" fill="hold">
+                                          <p:stCondLst>
+                                            <p:cond delay="499"/>
+                                          </p:stCondLst>
+                                        </p:cTn>
+                                        <p:tgtEl>
+                                          <p:spTgt spid="43"/>
+                                        </p:tgtEl>
+                                        <p:attrNameLst>
+                                          <p:attrName>style.visibility</p:attrName>
+                                        </p:attrNameLst>
+                                      </p:cBhvr>
+                                      <p:to>
+                                        <p:strVal val="hidden"/>
+                                      </p:to>
+                                    </p:set>
+                                  </p:childTnLst>
+                                </p:cTn>
+                              </p:par>
+                              <p:par>
+                                <p:cTn id="161" presetID="10" presetClass="exit" presetSubtype="0" fill="hold" grpId="1" nodeType="withEffect">
+                                  <p:stCondLst>
+                                    <p:cond delay="0"/>
+                                  </p:stCondLst>
+                                  <p:childTnLst>
+                                    <p:animEffect transition="out" filter="fade">
+                                      <p:cBhvr>
+                                        <p:cTn id="162" dur="500"/>
+                                        <p:tgtEl>
+                                          <p:spTgt spid="51"/>
+                                        </p:tgtEl>
+                                      </p:cBhvr>
+                                    </p:animEffect>
+                                    <p:set>
+                                      <p:cBhvr>
+                                        <p:cTn id="163" dur="1" fill="hold">
+                                          <p:stCondLst>
+                                            <p:cond delay="499"/>
+                                          </p:stCondLst>
+                                        </p:cTn>
+                                        <p:tgtEl>
+                                          <p:spTgt spid="51"/>
+                                        </p:tgtEl>
+                                        <p:attrNameLst>
+                                          <p:attrName>style.visibility</p:attrName>
+                                        </p:attrNameLst>
+                                      </p:cBhvr>
+                                      <p:to>
+                                        <p:strVal val="hidden"/>
+                                      </p:to>
+                                    </p:set>
+                                  </p:childTnLst>
+                                </p:cTn>
+                              </p:par>
+                              <p:par>
+                                <p:cTn id="164" presetID="10" presetClass="exit" presetSubtype="0" fill="hold" grpId="1" nodeType="withEffect">
+                                  <p:stCondLst>
+                                    <p:cond delay="0"/>
+                                  </p:stCondLst>
+                                  <p:childTnLst>
+                                    <p:animEffect transition="out" filter="fade">
+                                      <p:cBhvr>
+                                        <p:cTn id="165" dur="500"/>
+                                        <p:tgtEl>
+                                          <p:spTgt spid="46"/>
+                                        </p:tgtEl>
+                                      </p:cBhvr>
+                                    </p:animEffect>
+                                    <p:set>
+                                      <p:cBhvr>
+                                        <p:cTn id="166" dur="1" fill="hold">
+                                          <p:stCondLst>
+                                            <p:cond delay="499"/>
+                                          </p:stCondLst>
+                                        </p:cTn>
+                                        <p:tgtEl>
+                                          <p:spTgt spid="46"/>
+                                        </p:tgtEl>
+                                        <p:attrNameLst>
+                                          <p:attrName>style.visibility</p:attrName>
+                                        </p:attrNameLst>
+                                      </p:cBhvr>
+                                      <p:to>
+                                        <p:strVal val="hidden"/>
+                                      </p:to>
+                                    </p:set>
+                                  </p:childTnLst>
+                                </p:cTn>
+                              </p:par>
+                              <p:par>
+                                <p:cTn id="167" presetID="10" presetClass="exit" presetSubtype="0" fill="hold" grpId="1" nodeType="withEffect">
+                                  <p:stCondLst>
+                                    <p:cond delay="0"/>
+                                  </p:stCondLst>
+                                  <p:childTnLst>
+                                    <p:animEffect transition="out" filter="fade">
+                                      <p:cBhvr>
+                                        <p:cTn id="168" dur="500"/>
+                                        <p:tgtEl>
+                                          <p:spTgt spid="31"/>
+                                        </p:tgtEl>
+                                      </p:cBhvr>
+                                    </p:animEffect>
+                                    <p:set>
+                                      <p:cBhvr>
+                                        <p:cTn id="169" dur="1" fill="hold">
+                                          <p:stCondLst>
+                                            <p:cond delay="499"/>
+                                          </p:stCondLst>
+                                        </p:cTn>
+                                        <p:tgtEl>
+                                          <p:spTgt spid="31"/>
+                                        </p:tgtEl>
+                                        <p:attrNameLst>
+                                          <p:attrName>style.visibility</p:attrName>
+                                        </p:attrNameLst>
+                                      </p:cBhvr>
+                                      <p:to>
+                                        <p:strVal val="hidden"/>
+                                      </p:to>
+                                    </p:set>
+                                  </p:childTnLst>
+                                </p:cTn>
+                              </p:par>
+                              <p:par>
+                                <p:cTn id="170" presetID="10" presetClass="exit" presetSubtype="0" fill="hold" grpId="1" nodeType="withEffect">
+                                  <p:stCondLst>
+                                    <p:cond delay="0"/>
+                                  </p:stCondLst>
+                                  <p:childTnLst>
+                                    <p:animEffect transition="out" filter="fade">
+                                      <p:cBhvr>
+                                        <p:cTn id="171" dur="500"/>
+                                        <p:tgtEl>
+                                          <p:spTgt spid="49"/>
+                                        </p:tgtEl>
+                                      </p:cBhvr>
+                                    </p:animEffect>
+                                    <p:set>
+                                      <p:cBhvr>
+                                        <p:cTn id="172" dur="1" fill="hold">
+                                          <p:stCondLst>
+                                            <p:cond delay="499"/>
+                                          </p:stCondLst>
+                                        </p:cTn>
+                                        <p:tgtEl>
+                                          <p:spTgt spid="49"/>
+                                        </p:tgtEl>
+                                        <p:attrNameLst>
+                                          <p:attrName>style.visibility</p:attrName>
+                                        </p:attrNameLst>
+                                      </p:cBhvr>
+                                      <p:to>
+                                        <p:strVal val="hidden"/>
+                                      </p:to>
+                                    </p:set>
+                                  </p:childTnLst>
+                                </p:cTn>
+                              </p:par>
+                              <p:par>
+                                <p:cTn id="173" presetID="10" presetClass="exit" presetSubtype="0" fill="hold" grpId="1" nodeType="withEffect">
+                                  <p:stCondLst>
+                                    <p:cond delay="0"/>
+                                  </p:stCondLst>
+                                  <p:childTnLst>
+                                    <p:animEffect transition="out" filter="fade">
+                                      <p:cBhvr>
+                                        <p:cTn id="174" dur="500"/>
                                         <p:tgtEl>
                                           <p:spTgt spid="50"/>
                                         </p:tgtEl>
@@ -43900,7 +44986,7 @@
                                     </p:animEffect>
                                     <p:set>
                                       <p:cBhvr>
-                                        <p:cTn id="155" dur="1" fill="hold">
+                                        <p:cTn id="175" dur="1" fill="hold">
                                           <p:stCondLst>
                                             <p:cond delay="499"/>
                                           </p:stCondLst>
@@ -43926,32 +45012,314 @@
                     </p:cTn>
                   </p:par>
                   <p:par>
-                    <p:cTn id="156" fill="hold">
+                    <p:cTn id="176" fill="hold">
                       <p:stCondLst>
                         <p:cond delay="indefinite"/>
                       </p:stCondLst>
                       <p:childTnLst>
                         <p:par>
-                          <p:cTn id="157" fill="hold">
+                          <p:cTn id="177" fill="hold">
                             <p:stCondLst>
                               <p:cond delay="0"/>
                             </p:stCondLst>
                             <p:childTnLst>
                               <p:par>
-                                <p:cTn id="158" presetID="1" presetClass="entr" presetSubtype="0" fill="hold" grpId="0" nodeType="clickEffect">
+                                <p:cTn id="178" presetID="1" presetClass="entr" presetSubtype="0" fill="hold" grpId="0" nodeType="clickEffect">
                                   <p:stCondLst>
                                     <p:cond delay="0"/>
                                   </p:stCondLst>
                                   <p:childTnLst>
                                     <p:set>
                                       <p:cBhvr>
-                                        <p:cTn id="159" dur="1" fill="hold">
+                                        <p:cTn id="179" dur="1" fill="hold">
                                           <p:stCondLst>
                                             <p:cond delay="0"/>
                                           </p:stCondLst>
                                         </p:cTn>
                                         <p:tgtEl>
-                                          <p:spTgt spid="51"/>
+                                          <p:spTgt spid="53"/>
+                                        </p:tgtEl>
+                                        <p:attrNameLst>
+                                          <p:attrName>style.visibility</p:attrName>
+                                        </p:attrNameLst>
+                                      </p:cBhvr>
+                                      <p:to>
+                                        <p:strVal val="visible"/>
+                                      </p:to>
+                                    </p:set>
+                                  </p:childTnLst>
+                                </p:cTn>
+                              </p:par>
+                            </p:childTnLst>
+                          </p:cTn>
+                        </p:par>
+                      </p:childTnLst>
+                    </p:cTn>
+                  </p:par>
+                  <p:par>
+                    <p:cTn id="180" fill="hold">
+                      <p:stCondLst>
+                        <p:cond delay="indefinite"/>
+                      </p:stCondLst>
+                      <p:childTnLst>
+                        <p:par>
+                          <p:cTn id="181" fill="hold">
+                            <p:stCondLst>
+                              <p:cond delay="0"/>
+                            </p:stCondLst>
+                            <p:childTnLst>
+                              <p:par>
+                                <p:cTn id="182" presetID="1" presetClass="entr" presetSubtype="0" fill="hold" grpId="0" nodeType="clickEffect">
+                                  <p:stCondLst>
+                                    <p:cond delay="0"/>
+                                  </p:stCondLst>
+                                  <p:childTnLst>
+                                    <p:set>
+                                      <p:cBhvr>
+                                        <p:cTn id="183" dur="1" fill="hold">
+                                          <p:stCondLst>
+                                            <p:cond delay="0"/>
+                                          </p:stCondLst>
+                                        </p:cTn>
+                                        <p:tgtEl>
+                                          <p:spTgt spid="54"/>
+                                        </p:tgtEl>
+                                        <p:attrNameLst>
+                                          <p:attrName>style.visibility</p:attrName>
+                                        </p:attrNameLst>
+                                      </p:cBhvr>
+                                      <p:to>
+                                        <p:strVal val="visible"/>
+                                      </p:to>
+                                    </p:set>
+                                  </p:childTnLst>
+                                </p:cTn>
+                              </p:par>
+                            </p:childTnLst>
+                          </p:cTn>
+                        </p:par>
+                      </p:childTnLst>
+                    </p:cTn>
+                  </p:par>
+                  <p:par>
+                    <p:cTn id="184" fill="hold">
+                      <p:stCondLst>
+                        <p:cond delay="indefinite"/>
+                      </p:stCondLst>
+                      <p:childTnLst>
+                        <p:par>
+                          <p:cTn id="185" fill="hold">
+                            <p:stCondLst>
+                              <p:cond delay="0"/>
+                            </p:stCondLst>
+                            <p:childTnLst>
+                              <p:par>
+                                <p:cTn id="186" presetID="1" presetClass="entr" presetSubtype="0" fill="hold" grpId="0" nodeType="clickEffect">
+                                  <p:stCondLst>
+                                    <p:cond delay="0"/>
+                                  </p:stCondLst>
+                                  <p:childTnLst>
+                                    <p:set>
+                                      <p:cBhvr>
+                                        <p:cTn id="187" dur="1" fill="hold">
+                                          <p:stCondLst>
+                                            <p:cond delay="0"/>
+                                          </p:stCondLst>
+                                        </p:cTn>
+                                        <p:tgtEl>
+                                          <p:spTgt spid="59"/>
+                                        </p:tgtEl>
+                                        <p:attrNameLst>
+                                          <p:attrName>style.visibility</p:attrName>
+                                        </p:attrNameLst>
+                                      </p:cBhvr>
+                                      <p:to>
+                                        <p:strVal val="visible"/>
+                                      </p:to>
+                                    </p:set>
+                                  </p:childTnLst>
+                                  <p:subTnLst>
+                                    <p:set>
+                                      <p:cBhvr override="childStyle">
+                                        <p:cTn dur="1" fill="hold" display="0" masterRel="nextClick" afterEffect="1"/>
+                                        <p:tgtEl>
+                                          <p:spTgt spid="59"/>
+                                        </p:tgtEl>
+                                        <p:attrNameLst>
+                                          <p:attrName>style.visibility</p:attrName>
+                                        </p:attrNameLst>
+                                      </p:cBhvr>
+                                      <p:to>
+                                        <p:strVal val="hidden"/>
+                                      </p:to>
+                                    </p:set>
+                                  </p:subTnLst>
+                                </p:cTn>
+                              </p:par>
+                              <p:par>
+                                <p:cTn id="188" presetID="1" presetClass="entr" presetSubtype="0" fill="hold" grpId="0" nodeType="withEffect">
+                                  <p:stCondLst>
+                                    <p:cond delay="0"/>
+                                  </p:stCondLst>
+                                  <p:childTnLst>
+                                    <p:set>
+                                      <p:cBhvr>
+                                        <p:cTn id="189" dur="1" fill="hold">
+                                          <p:stCondLst>
+                                            <p:cond delay="0"/>
+                                          </p:stCondLst>
+                                        </p:cTn>
+                                        <p:tgtEl>
+                                          <p:spTgt spid="60"/>
+                                        </p:tgtEl>
+                                        <p:attrNameLst>
+                                          <p:attrName>style.visibility</p:attrName>
+                                        </p:attrNameLst>
+                                      </p:cBhvr>
+                                      <p:to>
+                                        <p:strVal val="visible"/>
+                                      </p:to>
+                                    </p:set>
+                                  </p:childTnLst>
+                                  <p:subTnLst>
+                                    <p:set>
+                                      <p:cBhvr override="childStyle">
+                                        <p:cTn dur="1" fill="hold" display="0" masterRel="nextClick" afterEffect="1"/>
+                                        <p:tgtEl>
+                                          <p:spTgt spid="60"/>
+                                        </p:tgtEl>
+                                        <p:attrNameLst>
+                                          <p:attrName>style.visibility</p:attrName>
+                                        </p:attrNameLst>
+                                      </p:cBhvr>
+                                      <p:to>
+                                        <p:strVal val="hidden"/>
+                                      </p:to>
+                                    </p:set>
+                                  </p:subTnLst>
+                                </p:cTn>
+                              </p:par>
+                              <p:par>
+                                <p:cTn id="190" presetID="1" presetClass="entr" presetSubtype="0" fill="hold" grpId="0" nodeType="withEffect">
+                                  <p:stCondLst>
+                                    <p:cond delay="0"/>
+                                  </p:stCondLst>
+                                  <p:childTnLst>
+                                    <p:set>
+                                      <p:cBhvr>
+                                        <p:cTn id="191" dur="1" fill="hold">
+                                          <p:stCondLst>
+                                            <p:cond delay="0"/>
+                                          </p:stCondLst>
+                                        </p:cTn>
+                                        <p:tgtEl>
+                                          <p:spTgt spid="63"/>
+                                        </p:tgtEl>
+                                        <p:attrNameLst>
+                                          <p:attrName>style.visibility</p:attrName>
+                                        </p:attrNameLst>
+                                      </p:cBhvr>
+                                      <p:to>
+                                        <p:strVal val="visible"/>
+                                      </p:to>
+                                    </p:set>
+                                  </p:childTnLst>
+                                  <p:subTnLst>
+                                    <p:set>
+                                      <p:cBhvr override="childStyle">
+                                        <p:cTn dur="1" fill="hold" display="0" masterRel="nextClick" afterEffect="1"/>
+                                        <p:tgtEl>
+                                          <p:spTgt spid="63"/>
+                                        </p:tgtEl>
+                                        <p:attrNameLst>
+                                          <p:attrName>style.visibility</p:attrName>
+                                        </p:attrNameLst>
+                                      </p:cBhvr>
+                                      <p:to>
+                                        <p:strVal val="hidden"/>
+                                      </p:to>
+                                    </p:set>
+                                  </p:subTnLst>
+                                </p:cTn>
+                              </p:par>
+                            </p:childTnLst>
+                          </p:cTn>
+                        </p:par>
+                      </p:childTnLst>
+                    </p:cTn>
+                  </p:par>
+                  <p:par>
+                    <p:cTn id="192" fill="hold">
+                      <p:stCondLst>
+                        <p:cond delay="indefinite"/>
+                      </p:stCondLst>
+                      <p:childTnLst>
+                        <p:par>
+                          <p:cTn id="193" fill="hold">
+                            <p:stCondLst>
+                              <p:cond delay="0"/>
+                            </p:stCondLst>
+                            <p:childTnLst>
+                              <p:par>
+                                <p:cTn id="194" presetID="1" presetClass="entr" presetSubtype="0" fill="hold" grpId="0" nodeType="clickEffect">
+                                  <p:stCondLst>
+                                    <p:cond delay="0"/>
+                                  </p:stCondLst>
+                                  <p:childTnLst>
+                                    <p:set>
+                                      <p:cBhvr>
+                                        <p:cTn id="195" dur="1" fill="hold">
+                                          <p:stCondLst>
+                                            <p:cond delay="0"/>
+                                          </p:stCondLst>
+                                        </p:cTn>
+                                        <p:tgtEl>
+                                          <p:spTgt spid="55"/>
+                                        </p:tgtEl>
+                                        <p:attrNameLst>
+                                          <p:attrName>style.visibility</p:attrName>
+                                        </p:attrNameLst>
+                                      </p:cBhvr>
+                                      <p:to>
+                                        <p:strVal val="visible"/>
+                                      </p:to>
+                                    </p:set>
+                                  </p:childTnLst>
+                                </p:cTn>
+                              </p:par>
+                            </p:childTnLst>
+                          </p:cTn>
+                        </p:par>
+                      </p:childTnLst>
+                    </p:cTn>
+                  </p:par>
+                  <p:par>
+                    <p:cTn id="196" fill="hold">
+                      <p:stCondLst>
+                        <p:cond delay="indefinite"/>
+                      </p:stCondLst>
+                      <p:childTnLst>
+                        <p:par>
+                          <p:cTn id="197" fill="hold">
+                            <p:stCondLst>
+                              <p:cond delay="0"/>
+                            </p:stCondLst>
+                            <p:childTnLst>
+                              <p:par>
+                                <p:cTn id="198" presetID="1" presetClass="entr" presetSubtype="0" fill="hold" grpId="0" nodeType="clickEffect">
+                                  <p:stCondLst>
+                                    <p:cond delay="0"/>
+                                  </p:stCondLst>
+                                  <p:childTnLst>
+                                    <p:set>
+                                      <p:cBhvr>
+                                        <p:cTn id="199" dur="1" fill="hold">
+                                          <p:stCondLst>
+                                            <p:cond delay="0"/>
+                                          </p:stCondLst>
+                                        </p:cTn>
+                                        <p:tgtEl>
+                                          <p:spTgt spid="56"/>
                                         </p:tgtEl>
                                         <p:attrNameLst>
                                           <p:attrName>style.visibility</p:attrName>
@@ -43965,28 +45333,204 @@
                                 </p:cTn>
                               </p:par>
                               <p:par>
-                                <p:cTn id="160" presetID="10" presetClass="exit" presetSubtype="0" fill="hold" grpId="1" nodeType="withEffect">
+                                <p:cTn id="200" presetID="1" presetClass="entr" presetSubtype="0" fill="hold" grpId="0" nodeType="withEffect">
+                                  <p:stCondLst>
+                                    <p:cond delay="0"/>
+                                  </p:stCondLst>
+                                  <p:childTnLst>
+                                    <p:set>
+                                      <p:cBhvr>
+                                        <p:cTn id="201" dur="1" fill="hold">
+                                          <p:stCondLst>
+                                            <p:cond delay="0"/>
+                                          </p:stCondLst>
+                                        </p:cTn>
+                                        <p:tgtEl>
+                                          <p:spTgt spid="61"/>
+                                        </p:tgtEl>
+                                        <p:attrNameLst>
+                                          <p:attrName>style.visibility</p:attrName>
+                                        </p:attrNameLst>
+                                      </p:cBhvr>
+                                      <p:to>
+                                        <p:strVal val="visible"/>
+                                      </p:to>
+                                    </p:set>
+                                  </p:childTnLst>
+                                  <p:subTnLst>
+                                    <p:set>
+                                      <p:cBhvr override="childStyle">
+                                        <p:cTn dur="1" fill="hold" display="0" masterRel="nextClick" afterEffect="1"/>
+                                        <p:tgtEl>
+                                          <p:spTgt spid="61"/>
+                                        </p:tgtEl>
+                                        <p:attrNameLst>
+                                          <p:attrName>style.visibility</p:attrName>
+                                        </p:attrNameLst>
+                                      </p:cBhvr>
+                                      <p:to>
+                                        <p:strVal val="hidden"/>
+                                      </p:to>
+                                    </p:set>
+                                  </p:subTnLst>
+                                </p:cTn>
+                              </p:par>
+                              <p:par>
+                                <p:cTn id="202" presetID="1" presetClass="entr" presetSubtype="0" fill="hold" grpId="0" nodeType="withEffect">
+                                  <p:stCondLst>
+                                    <p:cond delay="0"/>
+                                  </p:stCondLst>
+                                  <p:childTnLst>
+                                    <p:set>
+                                      <p:cBhvr>
+                                        <p:cTn id="203" dur="1" fill="hold">
+                                          <p:stCondLst>
+                                            <p:cond delay="0"/>
+                                          </p:stCondLst>
+                                        </p:cTn>
+                                        <p:tgtEl>
+                                          <p:spTgt spid="62"/>
+                                        </p:tgtEl>
+                                        <p:attrNameLst>
+                                          <p:attrName>style.visibility</p:attrName>
+                                        </p:attrNameLst>
+                                      </p:cBhvr>
+                                      <p:to>
+                                        <p:strVal val="visible"/>
+                                      </p:to>
+                                    </p:set>
+                                  </p:childTnLst>
+                                  <p:subTnLst>
+                                    <p:set>
+                                      <p:cBhvr override="childStyle">
+                                        <p:cTn dur="1" fill="hold" display="0" masterRel="nextClick" afterEffect="1"/>
+                                        <p:tgtEl>
+                                          <p:spTgt spid="62"/>
+                                        </p:tgtEl>
+                                        <p:attrNameLst>
+                                          <p:attrName>style.visibility</p:attrName>
+                                        </p:attrNameLst>
+                                      </p:cBhvr>
+                                      <p:to>
+                                        <p:strVal val="hidden"/>
+                                      </p:to>
+                                    </p:set>
+                                  </p:subTnLst>
+                                </p:cTn>
+                              </p:par>
+                            </p:childTnLst>
+                          </p:cTn>
+                        </p:par>
+                      </p:childTnLst>
+                    </p:cTn>
+                  </p:par>
+                  <p:par>
+                    <p:cTn id="204" fill="hold">
+                      <p:stCondLst>
+                        <p:cond delay="indefinite"/>
+                      </p:stCondLst>
+                      <p:childTnLst>
+                        <p:par>
+                          <p:cTn id="205" fill="hold">
+                            <p:stCondLst>
+                              <p:cond delay="0"/>
+                            </p:stCondLst>
+                            <p:childTnLst>
+                              <p:par>
+                                <p:cTn id="206" presetID="1" presetClass="entr" presetSubtype="0" fill="hold" grpId="0" nodeType="clickEffect">
+                                  <p:stCondLst>
+                                    <p:cond delay="0"/>
+                                  </p:stCondLst>
+                                  <p:childTnLst>
+                                    <p:set>
+                                      <p:cBhvr>
+                                        <p:cTn id="207" dur="1" fill="hold">
+                                          <p:stCondLst>
+                                            <p:cond delay="0"/>
+                                          </p:stCondLst>
+                                        </p:cTn>
+                                        <p:tgtEl>
+                                          <p:spTgt spid="57"/>
+                                        </p:tgtEl>
+                                        <p:attrNameLst>
+                                          <p:attrName>style.visibility</p:attrName>
+                                        </p:attrNameLst>
+                                      </p:cBhvr>
+                                      <p:to>
+                                        <p:strVal val="visible"/>
+                                      </p:to>
+                                    </p:set>
+                                  </p:childTnLst>
+                                </p:cTn>
+                              </p:par>
+                            </p:childTnLst>
+                          </p:cTn>
+                        </p:par>
+                      </p:childTnLst>
+                    </p:cTn>
+                  </p:par>
+                  <p:par>
+                    <p:cTn id="208" fill="hold">
+                      <p:stCondLst>
+                        <p:cond delay="indefinite"/>
+                      </p:stCondLst>
+                      <p:childTnLst>
+                        <p:par>
+                          <p:cTn id="209" fill="hold">
+                            <p:stCondLst>
+                              <p:cond delay="0"/>
+                            </p:stCondLst>
+                            <p:childTnLst>
+                              <p:par>
+                                <p:cTn id="210" presetID="1" presetClass="entr" presetSubtype="0" fill="hold" grpId="0" nodeType="clickEffect">
+                                  <p:stCondLst>
+                                    <p:cond delay="0"/>
+                                  </p:stCondLst>
+                                  <p:childTnLst>
+                                    <p:set>
+                                      <p:cBhvr>
+                                        <p:cTn id="211" dur="1" fill="hold">
+                                          <p:stCondLst>
+                                            <p:cond delay="0"/>
+                                          </p:stCondLst>
+                                        </p:cTn>
+                                        <p:tgtEl>
+                                          <p:spTgt spid="58"/>
+                                        </p:tgtEl>
+                                        <p:attrNameLst>
+                                          <p:attrName>style.visibility</p:attrName>
+                                        </p:attrNameLst>
+                                      </p:cBhvr>
+                                      <p:to>
+                                        <p:strVal val="visible"/>
+                                      </p:to>
+                                    </p:set>
+                                  </p:childTnLst>
+                                </p:cTn>
+                              </p:par>
+                              <p:par>
+                                <p:cTn id="212" presetID="10" presetClass="exit" presetSubtype="0" fill="hold" grpId="1" nodeType="withEffect">
                                   <p:stCondLst>
                                     <p:cond delay="0"/>
                                   </p:stCondLst>
                                   <p:childTnLst>
                                     <p:animEffect transition="out" filter="fade">
                                       <p:cBhvr>
-                                        <p:cTn id="161" dur="500"/>
+                                        <p:cTn id="213" dur="500"/>
                                         <p:tgtEl>
-                                          <p:spTgt spid="51"/>
+                                          <p:spTgt spid="54"/>
                                         </p:tgtEl>
                                       </p:cBhvr>
                                     </p:animEffect>
                                     <p:set>
                                       <p:cBhvr>
-                                        <p:cTn id="162" dur="1" fill="hold">
+                                        <p:cTn id="214" dur="1" fill="hold">
                                           <p:stCondLst>
                                             <p:cond delay="499"/>
                                           </p:stCondLst>
                                         </p:cTn>
                                         <p:tgtEl>
-                                          <p:spTgt spid="51"/>
+                                          <p:spTgt spid="54"/>
                                         </p:tgtEl>
                                         <p:attrNameLst>
                                           <p:attrName>style.visibility</p:attrName>
@@ -44000,55 +45544,28 @@
                                 </p:cTn>
                               </p:par>
                               <p:par>
-                                <p:cTn id="163" presetID="1" presetClass="entr" presetSubtype="0" fill="hold" nodeType="withEffect">
-                                  <p:stCondLst>
-                                    <p:cond delay="0"/>
-                                  </p:stCondLst>
-                                  <p:childTnLst>
-                                    <p:set>
-                                      <p:cBhvr>
-                                        <p:cTn id="164" dur="1" fill="hold">
-                                          <p:stCondLst>
-                                            <p:cond delay="0"/>
-                                          </p:stCondLst>
-                                        </p:cTn>
-                                        <p:tgtEl>
-                                          <p:spTgt spid="52"/>
-                                        </p:tgtEl>
-                                        <p:attrNameLst>
-                                          <p:attrName>style.visibility</p:attrName>
-                                        </p:attrNameLst>
-                                      </p:cBhvr>
-                                      <p:to>
-                                        <p:strVal val="visible"/>
-                                      </p:to>
-                                    </p:set>
-                                  </p:childTnLst>
-                                </p:cTn>
-                              </p:par>
-                              <p:par>
-                                <p:cTn id="165" presetID="10" presetClass="exit" presetSubtype="0" fill="hold" nodeType="withEffect">
+                                <p:cTn id="215" presetID="10" presetClass="exit" presetSubtype="0" fill="hold" grpId="1" nodeType="withEffect">
                                   <p:stCondLst>
                                     <p:cond delay="0"/>
                                   </p:stCondLst>
                                   <p:childTnLst>
                                     <p:animEffect transition="out" filter="fade">
                                       <p:cBhvr>
-                                        <p:cTn id="166" dur="500"/>
+                                        <p:cTn id="216" dur="500"/>
                                         <p:tgtEl>
-                                          <p:spTgt spid="52"/>
+                                          <p:spTgt spid="56"/>
                                         </p:tgtEl>
                                       </p:cBhvr>
                                     </p:animEffect>
                                     <p:set>
                                       <p:cBhvr>
-                                        <p:cTn id="167" dur="1" fill="hold">
+                                        <p:cTn id="217" dur="1" fill="hold">
                                           <p:stCondLst>
                                             <p:cond delay="499"/>
                                           </p:stCondLst>
                                         </p:cTn>
                                         <p:tgtEl>
-                                          <p:spTgt spid="52"/>
+                                          <p:spTgt spid="56"/>
                                         </p:tgtEl>
                                         <p:attrNameLst>
                                           <p:attrName>style.visibility</p:attrName>
@@ -44061,47 +45578,29 @@
                                   </p:childTnLst>
                                 </p:cTn>
                               </p:par>
-                            </p:childTnLst>
-                          </p:cTn>
-                        </p:par>
-                      </p:childTnLst>
-                    </p:cTn>
-                  </p:par>
-                  <p:par>
-                    <p:cTn id="168" fill="hold">
-                      <p:stCondLst>
-                        <p:cond delay="indefinite"/>
-                      </p:stCondLst>
-                      <p:childTnLst>
-                        <p:par>
-                          <p:cTn id="169" fill="hold">
-                            <p:stCondLst>
-                              <p:cond delay="0"/>
-                            </p:stCondLst>
-                            <p:childTnLst>
                               <p:par>
-                                <p:cTn id="170" presetID="10" presetClass="exit" presetSubtype="0" fill="hold" grpId="1" nodeType="clickEffect">
+                                <p:cTn id="218" presetID="10" presetClass="exit" presetSubtype="0" fill="hold" grpId="1" nodeType="withEffect">
                                   <p:stCondLst>
                                     <p:cond delay="0"/>
                                   </p:stCondLst>
                                   <p:childTnLst>
                                     <p:animEffect transition="out" filter="fade">
                                       <p:cBhvr>
-                                        <p:cTn id="171" dur="500"/>
+                                        <p:cTn id="219" dur="500"/>
                                         <p:tgtEl>
-                                          <p:spTgt spid="30"/>
+                                          <p:spTgt spid="53"/>
                                         </p:tgtEl>
                                       </p:cBhvr>
                                     </p:animEffect>
                                     <p:set>
                                       <p:cBhvr>
-                                        <p:cTn id="172" dur="1" fill="hold">
+                                        <p:cTn id="220" dur="1" fill="hold">
                                           <p:stCondLst>
                                             <p:cond delay="499"/>
                                           </p:stCondLst>
                                         </p:cTn>
                                         <p:tgtEl>
-                                          <p:spTgt spid="30"/>
+                                          <p:spTgt spid="53"/>
                                         </p:tgtEl>
                                         <p:attrNameLst>
                                           <p:attrName>style.visibility</p:attrName>
@@ -44114,47 +45613,169 @@
                                   </p:childTnLst>
                                 </p:cTn>
                               </p:par>
-                            </p:childTnLst>
-                          </p:cTn>
-                        </p:par>
-                      </p:childTnLst>
-                    </p:cTn>
-                  </p:par>
-                  <p:par>
-                    <p:cTn id="173" fill="hold">
-                      <p:stCondLst>
-                        <p:cond delay="indefinite"/>
-                      </p:stCondLst>
-                      <p:childTnLst>
-                        <p:par>
-                          <p:cTn id="174" fill="hold">
-                            <p:stCondLst>
-                              <p:cond delay="0"/>
-                            </p:stCondLst>
-                            <p:childTnLst>
                               <p:par>
-                                <p:cTn id="175" presetID="10" presetClass="exit" presetSubtype="0" fill="hold" grpId="1" nodeType="clickEffect">
+                                <p:cTn id="221" presetID="10" presetClass="exit" presetSubtype="0" fill="hold" grpId="1" nodeType="withEffect">
                                   <p:stCondLst>
                                     <p:cond delay="0"/>
                                   </p:stCondLst>
                                   <p:childTnLst>
                                     <p:animEffect transition="out" filter="fade">
                                       <p:cBhvr>
-                                        <p:cTn id="176" dur="500"/>
+                                        <p:cTn id="222" dur="500"/>
                                         <p:tgtEl>
-                                          <p:spTgt spid="43"/>
+                                          <p:spTgt spid="57"/>
                                         </p:tgtEl>
                                       </p:cBhvr>
                                     </p:animEffect>
                                     <p:set>
                                       <p:cBhvr>
-                                        <p:cTn id="177" dur="1" fill="hold">
+                                        <p:cTn id="223" dur="1" fill="hold">
                                           <p:stCondLst>
                                             <p:cond delay="499"/>
                                           </p:stCondLst>
                                         </p:cTn>
                                         <p:tgtEl>
-                                          <p:spTgt spid="43"/>
+                                          <p:spTgt spid="57"/>
+                                        </p:tgtEl>
+                                        <p:attrNameLst>
+                                          <p:attrName>style.visibility</p:attrName>
+                                        </p:attrNameLst>
+                                      </p:cBhvr>
+                                      <p:to>
+                                        <p:strVal val="hidden"/>
+                                      </p:to>
+                                    </p:set>
+                                  </p:childTnLst>
+                                </p:cTn>
+                              </p:par>
+                              <p:par>
+                                <p:cTn id="224" presetID="10" presetClass="exit" presetSubtype="0" fill="hold" grpId="1" nodeType="withEffect">
+                                  <p:stCondLst>
+                                    <p:cond delay="0"/>
+                                  </p:stCondLst>
+                                  <p:childTnLst>
+                                    <p:animEffect transition="out" filter="fade">
+                                      <p:cBhvr>
+                                        <p:cTn id="225" dur="500"/>
+                                        <p:tgtEl>
+                                          <p:spTgt spid="55"/>
+                                        </p:tgtEl>
+                                      </p:cBhvr>
+                                    </p:animEffect>
+                                    <p:set>
+                                      <p:cBhvr>
+                                        <p:cTn id="226" dur="1" fill="hold">
+                                          <p:stCondLst>
+                                            <p:cond delay="499"/>
+                                          </p:stCondLst>
+                                        </p:cTn>
+                                        <p:tgtEl>
+                                          <p:spTgt spid="55"/>
+                                        </p:tgtEl>
+                                        <p:attrNameLst>
+                                          <p:attrName>style.visibility</p:attrName>
+                                        </p:attrNameLst>
+                                      </p:cBhvr>
+                                      <p:to>
+                                        <p:strVal val="hidden"/>
+                                      </p:to>
+                                    </p:set>
+                                  </p:childTnLst>
+                                </p:cTn>
+                              </p:par>
+                              <p:par>
+                                <p:cTn id="227" presetID="10" presetClass="exit" presetSubtype="0" fill="hold" grpId="1" nodeType="withEffect">
+                                  <p:stCondLst>
+                                    <p:cond delay="0"/>
+                                  </p:stCondLst>
+                                  <p:childTnLst>
+                                    <p:animEffect transition="out" filter="fade">
+                                      <p:cBhvr>
+                                        <p:cTn id="228" dur="500"/>
+                                        <p:tgtEl>
+                                          <p:spTgt spid="59"/>
+                                        </p:tgtEl>
+                                      </p:cBhvr>
+                                    </p:animEffect>
+                                    <p:set>
+                                      <p:cBhvr>
+                                        <p:cTn id="229" dur="1" fill="hold">
+                                          <p:stCondLst>
+                                            <p:cond delay="499"/>
+                                          </p:stCondLst>
+                                        </p:cTn>
+                                        <p:tgtEl>
+                                          <p:spTgt spid="59"/>
+                                        </p:tgtEl>
+                                        <p:attrNameLst>
+                                          <p:attrName>style.visibility</p:attrName>
+                                        </p:attrNameLst>
+                                      </p:cBhvr>
+                                      <p:to>
+                                        <p:strVal val="hidden"/>
+                                      </p:to>
+                                    </p:set>
+                                  </p:childTnLst>
+                                </p:cTn>
+                              </p:par>
+                              <p:par>
+                                <p:cTn id="230" presetID="10" presetClass="exit" presetSubtype="0" fill="hold" grpId="1" nodeType="withEffect">
+                                  <p:stCondLst>
+                                    <p:cond delay="0"/>
+                                  </p:stCondLst>
+                                  <p:childTnLst>
+                                    <p:animEffect transition="out" filter="fade">
+                                      <p:cBhvr>
+                                        <p:cTn id="231" dur="500"/>
+                                        <p:tgtEl>
+                                          <p:spTgt spid="58"/>
+                                        </p:tgtEl>
+                                      </p:cBhvr>
+                                    </p:animEffect>
+                                    <p:set>
+                                      <p:cBhvr>
+                                        <p:cTn id="232" dur="1" fill="hold">
+                                          <p:stCondLst>
+                                            <p:cond delay="499"/>
+                                          </p:stCondLst>
+                                        </p:cTn>
+                                        <p:tgtEl>
+                                          <p:spTgt spid="58"/>
+                                        </p:tgtEl>
+                                        <p:attrNameLst>
+                                          <p:attrName>style.visibility</p:attrName>
+                                        </p:attrNameLst>
+                                      </p:cBhvr>
+                                      <p:to>
+                                        <p:strVal val="hidden"/>
+                                      </p:to>
+                                    </p:set>
+                                  </p:childTnLst>
+                                </p:cTn>
+                              </p:par>
+                              <p:par>
+                                <p:cTn id="233" presetID="10" presetClass="exit" presetSubtype="0" fill="hold" grpId="1" nodeType="withEffect">
+                                  <p:stCondLst>
+                                    <p:cond delay="0"/>
+                                  </p:stCondLst>
+                                  <p:childTnLst>
+                                    <p:animEffect transition="out" filter="fade">
+                                      <p:cBhvr>
+                                        <p:cTn id="234" dur="500"/>
+                                        <p:tgtEl>
+                                          <p:spTgt spid="61"/>
+                                        </p:tgtEl>
+                                      </p:cBhvr>
+                                    </p:animEffect>
+                                    <p:set>
+                                      <p:cBhvr>
+                                        <p:cTn id="235" dur="1" fill="hold">
+                                          <p:stCondLst>
+                                            <p:cond delay="499"/>
+                                          </p:stCondLst>
+                                        </p:cTn>
+                                        <p:tgtEl>
+                                          <p:spTgt spid="61"/>
                                         </p:tgtEl>
                                         <p:attrNameLst>
                                           <p:attrName>style.visibility</p:attrName>
@@ -44240,6 +45861,25 @@
       <p:bldP spid="50" grpId="1" animBg="1"/>
       <p:bldP spid="51" grpId="0" animBg="1"/>
       <p:bldP spid="51" grpId="1" animBg="1"/>
+      <p:bldP spid="53" grpId="0" animBg="1"/>
+      <p:bldP spid="53" grpId="1" animBg="1"/>
+      <p:bldP spid="54" grpId="0" animBg="1"/>
+      <p:bldP spid="54" grpId="1" animBg="1"/>
+      <p:bldP spid="55" grpId="0" animBg="1"/>
+      <p:bldP spid="55" grpId="1" animBg="1"/>
+      <p:bldP spid="56" grpId="0" animBg="1"/>
+      <p:bldP spid="56" grpId="1" animBg="1"/>
+      <p:bldP spid="57" grpId="0" animBg="1"/>
+      <p:bldP spid="57" grpId="1" animBg="1"/>
+      <p:bldP spid="58" grpId="0" animBg="1"/>
+      <p:bldP spid="58" grpId="1" animBg="1"/>
+      <p:bldP spid="59" grpId="0" animBg="1"/>
+      <p:bldP spid="59" grpId="1" animBg="1"/>
+      <p:bldP spid="60" grpId="0" animBg="1"/>
+      <p:bldP spid="61" grpId="0" animBg="1"/>
+      <p:bldP spid="61" grpId="1" animBg="1"/>
+      <p:bldP spid="62" grpId="0" animBg="1"/>
+      <p:bldP spid="63" grpId="0" animBg="1"/>
     </p:bldLst>
   </p:timing>
 </p:sld>

</xml_diff>

<commit_message>
biggest page in PPT ready
</commit_message>
<xml_diff>
--- a/Documents/Midterm_exam_Presentation.pptx
+++ b/Documents/Midterm_exam_Presentation.pptx
@@ -39282,8 +39282,8 @@
           </a:p>
         </p:txBody>
       </p:sp>
-      <mc:AlternateContent xmlns:mc="http://schemas.openxmlformats.org/markup-compatibility/2006" xmlns:a14="http://schemas.microsoft.com/office/drawing/2010/main">
-        <mc:Choice Requires="a14">
+      <mc:AlternateContent xmlns:mc="http://schemas.openxmlformats.org/markup-compatibility/2006">
+        <mc:Choice xmlns:a14="http://schemas.microsoft.com/office/drawing/2010/main" Requires="a14">
           <p:sp>
             <p:nvSpPr>
               <p:cNvPr id="54275" name="Rectangle 3"/>
@@ -39398,12 +39398,17 @@
                 </a14:m>
                 <a:r>
                   <a:rPr lang="he-IL" sz="1800" dirty="0"/>
-                  <a:t>, ולכן כל הדגמה על עץ רישות נכונה גם עבור עץ סיפות</a:t>
-                </a:r>
-                <a:r>
-                  <a:rPr lang="he-IL" sz="1800" dirty="0" smtClean="0"/>
-                  <a:t>.</a:t>
-                </a:r>
+                  <a:t>, ולכן כל הדגמה על עץ רישות נכונה גם עבור </a:t>
+                </a:r>
+                <a:r>
+                  <a:rPr lang="he-IL" sz="1800"/>
+                  <a:t>עץ </a:t>
+                </a:r>
+                <a:r>
+                  <a:rPr lang="he-IL" sz="1800" smtClean="0"/>
+                  <a:t>סיפות).</a:t>
+                </a:r>
+                <a:endParaRPr lang="he-IL" sz="1800" dirty="0" smtClean="0"/>
               </a:p>
               <a:p>
                 <a:pPr marL="0" indent="0">
@@ -39567,7 +39572,7 @@
             </p:txBody>
           </p:sp>
         </mc:Choice>
-        <mc:Fallback xmlns="">
+        <mc:Fallback>
           <p:sp>
             <p:nvSpPr>
               <p:cNvPr id="54275" name="Rectangle 3"/>
@@ -42762,6 +42767,251 @@
           </a:p>
         </p:txBody>
       </p:sp>
+      <p:sp>
+        <p:nvSpPr>
+          <p:cNvPr id="64" name="Rectangle 63"/>
+          <p:cNvSpPr/>
+          <p:nvPr/>
+        </p:nvSpPr>
+        <p:spPr bwMode="auto">
+          <a:xfrm>
+            <a:off x="971600" y="4541055"/>
+            <a:ext cx="306000" cy="256097"/>
+          </a:xfrm>
+          <a:prstGeom prst="rect">
+            <a:avLst/>
+          </a:prstGeom>
+          <a:solidFill>
+            <a:srgbClr val="FF0000">
+              <a:alpha val="27000"/>
+            </a:srgbClr>
+          </a:solidFill>
+          <a:ln w="9525" cap="flat" cmpd="sng" algn="ctr">
+            <a:solidFill>
+              <a:schemeClr val="tx1"/>
+            </a:solidFill>
+            <a:prstDash val="solid"/>
+            <a:round/>
+            <a:headEnd type="none" w="med" len="med"/>
+            <a:tailEnd type="none" w="med" len="med"/>
+          </a:ln>
+          <a:effectLst/>
+          <a:extLst/>
+        </p:spPr>
+        <p:txBody>
+          <a:bodyPr vert="horz" wrap="square" lIns="91440" tIns="45720" rIns="91440" bIns="45720" numCol="1" rtlCol="1" anchor="t" anchorCtr="0" compatLnSpc="1">
+            <a:prstTxWarp prst="textNoShape">
+              <a:avLst/>
+            </a:prstTxWarp>
+          </a:bodyPr>
+          <a:lstStyle/>
+          <a:p>
+            <a:pPr marL="0" marR="0" indent="0" algn="l" defTabSz="914400" rtl="0" eaLnBrk="1" fontAlgn="base" latinLnBrk="0" hangingPunct="1">
+              <a:lnSpc>
+                <a:spcPct val="100000"/>
+              </a:lnSpc>
+              <a:spcBef>
+                <a:spcPct val="0"/>
+              </a:spcBef>
+              <a:spcAft>
+                <a:spcPct val="0"/>
+              </a:spcAft>
+              <a:buClrTx/>
+              <a:buSzTx/>
+              <a:buFontTx/>
+              <a:buNone/>
+              <a:tabLst/>
+            </a:pPr>
+            <a:endParaRPr kumimoji="0" lang="he-IL" sz="1800" b="0" i="0" u="none" strike="noStrike" cap="none" normalizeH="0" baseline="0" smtClean="0">
+              <a:ln>
+                <a:noFill/>
+              </a:ln>
+              <a:solidFill>
+                <a:schemeClr val="tx1"/>
+              </a:solidFill>
+              <a:effectLst/>
+              <a:latin typeface="Arial" pitchFamily="34" charset="0"/>
+            </a:endParaRPr>
+          </a:p>
+        </p:txBody>
+      </p:sp>
+      <p:pic>
+        <p:nvPicPr>
+          <p:cNvPr id="1027" name="Picture 3" descr="C:\Users\Avi\AppData\Local\Microsoft\Windows\Temporary Internet Files\Content.IE5\XP2OWRGC\23493485345[1].png"/>
+          <p:cNvPicPr>
+            <a:picLocks noChangeAspect="1" noChangeArrowheads="1"/>
+          </p:cNvPicPr>
+          <p:nvPr/>
+        </p:nvPicPr>
+        <p:blipFill>
+          <a:blip r:embed="rId7" cstate="print">
+            <a:extLst>
+              <a:ext uri="{28A0092B-C50C-407E-A947-70E740481C1C}">
+                <a14:useLocalDpi xmlns:a14="http://schemas.microsoft.com/office/drawing/2010/main" val="0"/>
+              </a:ext>
+            </a:extLst>
+          </a:blip>
+          <a:srcRect/>
+          <a:stretch>
+            <a:fillRect/>
+          </a:stretch>
+        </p:blipFill>
+        <p:spPr bwMode="auto">
+          <a:xfrm>
+            <a:off x="7966287" y="4521285"/>
+            <a:ext cx="412225" cy="347597"/>
+          </a:xfrm>
+          <a:prstGeom prst="rect">
+            <a:avLst/>
+          </a:prstGeom>
+          <a:noFill/>
+          <a:extLst>
+            <a:ext uri="{909E8E84-426E-40DD-AFC4-6F175D3DCCD1}">
+              <a14:hiddenFill xmlns:a14="http://schemas.microsoft.com/office/drawing/2010/main">
+                <a:solidFill>
+                  <a:srgbClr val="FFFFFF"/>
+                </a:solidFill>
+              </a14:hiddenFill>
+            </a:ext>
+          </a:extLst>
+        </p:spPr>
+      </p:pic>
+      <p:sp>
+        <p:nvSpPr>
+          <p:cNvPr id="65" name="Rectangle 64"/>
+          <p:cNvSpPr/>
+          <p:nvPr/>
+        </p:nvSpPr>
+        <p:spPr bwMode="auto">
+          <a:xfrm>
+            <a:off x="7956376" y="4293096"/>
+            <a:ext cx="504056" cy="256096"/>
+          </a:xfrm>
+          <a:prstGeom prst="rect">
+            <a:avLst/>
+          </a:prstGeom>
+          <a:solidFill>
+            <a:srgbClr val="00B0F0">
+              <a:alpha val="27000"/>
+            </a:srgbClr>
+          </a:solidFill>
+          <a:ln w="9525" cap="flat" cmpd="sng" algn="ctr">
+            <a:solidFill>
+              <a:schemeClr val="tx1"/>
+            </a:solidFill>
+            <a:prstDash val="solid"/>
+            <a:round/>
+            <a:headEnd type="none" w="med" len="med"/>
+            <a:tailEnd type="none" w="med" len="med"/>
+          </a:ln>
+          <a:effectLst/>
+          <a:extLst/>
+        </p:spPr>
+        <p:txBody>
+          <a:bodyPr vert="horz" wrap="square" lIns="91440" tIns="45720" rIns="91440" bIns="45720" numCol="1" rtlCol="1" anchor="t" anchorCtr="0" compatLnSpc="1">
+            <a:prstTxWarp prst="textNoShape">
+              <a:avLst/>
+            </a:prstTxWarp>
+          </a:bodyPr>
+          <a:lstStyle/>
+          <a:p>
+            <a:pPr marL="0" marR="0" indent="0" algn="l" defTabSz="914400" rtl="0" eaLnBrk="1" fontAlgn="base" latinLnBrk="0" hangingPunct="1">
+              <a:lnSpc>
+                <a:spcPct val="100000"/>
+              </a:lnSpc>
+              <a:spcBef>
+                <a:spcPct val="0"/>
+              </a:spcBef>
+              <a:spcAft>
+                <a:spcPct val="0"/>
+              </a:spcAft>
+              <a:buClrTx/>
+              <a:buSzTx/>
+              <a:buFontTx/>
+              <a:buNone/>
+              <a:tabLst/>
+            </a:pPr>
+            <a:endParaRPr kumimoji="0" lang="he-IL" sz="1800" b="0" i="0" u="none" strike="noStrike" cap="none" normalizeH="0" baseline="0" smtClean="0">
+              <a:ln>
+                <a:noFill/>
+              </a:ln>
+              <a:solidFill>
+                <a:schemeClr val="tx1"/>
+              </a:solidFill>
+              <a:effectLst/>
+              <a:latin typeface="Arial" pitchFamily="34" charset="0"/>
+            </a:endParaRPr>
+          </a:p>
+        </p:txBody>
+      </p:sp>
+      <p:sp>
+        <p:nvSpPr>
+          <p:cNvPr id="66" name="Rectangle 65"/>
+          <p:cNvSpPr/>
+          <p:nvPr/>
+        </p:nvSpPr>
+        <p:spPr bwMode="auto">
+          <a:xfrm>
+            <a:off x="323528" y="3356992"/>
+            <a:ext cx="1152128" cy="218021"/>
+          </a:xfrm>
+          <a:prstGeom prst="rect">
+            <a:avLst/>
+          </a:prstGeom>
+          <a:solidFill>
+            <a:srgbClr val="00B0F0">
+              <a:alpha val="27000"/>
+            </a:srgbClr>
+          </a:solidFill>
+          <a:ln w="9525" cap="flat" cmpd="sng" algn="ctr">
+            <a:solidFill>
+              <a:schemeClr val="tx1"/>
+            </a:solidFill>
+            <a:prstDash val="solid"/>
+            <a:round/>
+            <a:headEnd type="none" w="med" len="med"/>
+            <a:tailEnd type="none" w="med" len="med"/>
+          </a:ln>
+          <a:effectLst/>
+          <a:extLst/>
+        </p:spPr>
+        <p:txBody>
+          <a:bodyPr vert="horz" wrap="square" lIns="91440" tIns="45720" rIns="91440" bIns="45720" numCol="1" rtlCol="1" anchor="t" anchorCtr="0" compatLnSpc="1">
+            <a:prstTxWarp prst="textNoShape">
+              <a:avLst/>
+            </a:prstTxWarp>
+          </a:bodyPr>
+          <a:lstStyle/>
+          <a:p>
+            <a:pPr marL="0" marR="0" indent="0" algn="l" defTabSz="914400" rtl="0" eaLnBrk="1" fontAlgn="base" latinLnBrk="0" hangingPunct="1">
+              <a:lnSpc>
+                <a:spcPct val="100000"/>
+              </a:lnSpc>
+              <a:spcBef>
+                <a:spcPct val="0"/>
+              </a:spcBef>
+              <a:spcAft>
+                <a:spcPct val="0"/>
+              </a:spcAft>
+              <a:buClrTx/>
+              <a:buSzTx/>
+              <a:buFontTx/>
+              <a:buNone/>
+              <a:tabLst/>
+            </a:pPr>
+            <a:endParaRPr kumimoji="0" lang="he-IL" sz="1800" b="0" i="0" u="none" strike="noStrike" cap="none" normalizeH="0" baseline="0" smtClean="0">
+              <a:ln>
+                <a:noFill/>
+              </a:ln>
+              <a:solidFill>
+                <a:schemeClr val="tx1"/>
+              </a:solidFill>
+              <a:effectLst/>
+              <a:latin typeface="Arial" pitchFamily="34" charset="0"/>
+            </a:endParaRPr>
+          </a:p>
+        </p:txBody>
+      </p:sp>
     </p:spTree>
     <p:extLst>
       <p:ext uri="{BB962C8B-B14F-4D97-AF65-F5344CB8AC3E}">
@@ -45095,33 +45345,15 @@
                                   </p:childTnLst>
                                 </p:cTn>
                               </p:par>
-                            </p:childTnLst>
-                          </p:cTn>
-                        </p:par>
-                      </p:childTnLst>
-                    </p:cTn>
-                  </p:par>
-                  <p:par>
-                    <p:cTn id="184" fill="hold">
-                      <p:stCondLst>
-                        <p:cond delay="indefinite"/>
-                      </p:stCondLst>
-                      <p:childTnLst>
-                        <p:par>
-                          <p:cTn id="185" fill="hold">
-                            <p:stCondLst>
-                              <p:cond delay="0"/>
-                            </p:stCondLst>
-                            <p:childTnLst>
                               <p:par>
-                                <p:cTn id="186" presetID="1" presetClass="entr" presetSubtype="0" fill="hold" grpId="0" nodeType="clickEffect">
+                                <p:cTn id="184" presetID="1" presetClass="entr" presetSubtype="0" fill="hold" grpId="0" nodeType="withEffect">
                                   <p:stCondLst>
                                     <p:cond delay="0"/>
                                   </p:stCondLst>
                                   <p:childTnLst>
                                     <p:set>
                                       <p:cBhvr>
-                                        <p:cTn id="187" dur="1" fill="hold">
+                                        <p:cTn id="185" dur="1" fill="hold">
                                           <p:stCondLst>
                                             <p:cond delay="0"/>
                                           </p:stCondLst>
@@ -45157,14 +45389,14 @@
                                 </p:cTn>
                               </p:par>
                               <p:par>
-                                <p:cTn id="188" presetID="1" presetClass="entr" presetSubtype="0" fill="hold" grpId="0" nodeType="withEffect">
+                                <p:cTn id="186" presetID="1" presetClass="entr" presetSubtype="0" fill="hold" grpId="0" nodeType="withEffect">
                                   <p:stCondLst>
                                     <p:cond delay="0"/>
                                   </p:stCondLst>
                                   <p:childTnLst>
                                     <p:set>
                                       <p:cBhvr>
-                                        <p:cTn id="189" dur="1" fill="hold">
+                                        <p:cTn id="187" dur="1" fill="hold">
                                           <p:stCondLst>
                                             <p:cond delay="0"/>
                                           </p:stCondLst>
@@ -45200,14 +45432,14 @@
                                 </p:cTn>
                               </p:par>
                               <p:par>
-                                <p:cTn id="190" presetID="1" presetClass="entr" presetSubtype="0" fill="hold" grpId="0" nodeType="withEffect">
+                                <p:cTn id="188" presetID="1" presetClass="entr" presetSubtype="0" fill="hold" grpId="0" nodeType="withEffect">
                                   <p:stCondLst>
                                     <p:cond delay="0"/>
                                   </p:stCondLst>
                                   <p:childTnLst>
                                     <p:set>
                                       <p:cBhvr>
-                                        <p:cTn id="191" dur="1" fill="hold">
+                                        <p:cTn id="189" dur="1" fill="hold">
                                           <p:stCondLst>
                                             <p:cond delay="0"/>
                                           </p:stCondLst>
@@ -45249,26 +45481,26 @@
                     </p:cTn>
                   </p:par>
                   <p:par>
-                    <p:cTn id="192" fill="hold">
+                    <p:cTn id="190" fill="hold">
                       <p:stCondLst>
                         <p:cond delay="indefinite"/>
                       </p:stCondLst>
                       <p:childTnLst>
                         <p:par>
-                          <p:cTn id="193" fill="hold">
+                          <p:cTn id="191" fill="hold">
                             <p:stCondLst>
                               <p:cond delay="0"/>
                             </p:stCondLst>
                             <p:childTnLst>
                               <p:par>
-                                <p:cTn id="194" presetID="1" presetClass="entr" presetSubtype="0" fill="hold" grpId="0" nodeType="clickEffect">
+                                <p:cTn id="192" presetID="1" presetClass="entr" presetSubtype="0" fill="hold" grpId="0" nodeType="clickEffect">
                                   <p:stCondLst>
                                     <p:cond delay="0"/>
                                   </p:stCondLst>
                                   <p:childTnLst>
                                     <p:set>
                                       <p:cBhvr>
-                                        <p:cTn id="195" dur="1" fill="hold">
+                                        <p:cTn id="193" dur="1" fill="hold">
                                           <p:stCondLst>
                                             <p:cond delay="0"/>
                                           </p:stCondLst>
@@ -45294,26 +45526,26 @@
                     </p:cTn>
                   </p:par>
                   <p:par>
-                    <p:cTn id="196" fill="hold">
+                    <p:cTn id="194" fill="hold">
                       <p:stCondLst>
                         <p:cond delay="indefinite"/>
                       </p:stCondLst>
                       <p:childTnLst>
                         <p:par>
-                          <p:cTn id="197" fill="hold">
+                          <p:cTn id="195" fill="hold">
                             <p:stCondLst>
                               <p:cond delay="0"/>
                             </p:stCondLst>
                             <p:childTnLst>
                               <p:par>
-                                <p:cTn id="198" presetID="1" presetClass="entr" presetSubtype="0" fill="hold" grpId="0" nodeType="clickEffect">
+                                <p:cTn id="196" presetID="1" presetClass="entr" presetSubtype="0" fill="hold" grpId="0" nodeType="clickEffect">
                                   <p:stCondLst>
                                     <p:cond delay="0"/>
                                   </p:stCondLst>
                                   <p:childTnLst>
                                     <p:set>
                                       <p:cBhvr>
-                                        <p:cTn id="199" dur="1" fill="hold">
+                                        <p:cTn id="197" dur="1" fill="hold">
                                           <p:stCondLst>
                                             <p:cond delay="0"/>
                                           </p:stCondLst>
@@ -45330,6 +45562,49 @@
                                       </p:to>
                                     </p:set>
                                   </p:childTnLst>
+                                </p:cTn>
+                              </p:par>
+                              <p:par>
+                                <p:cTn id="198" presetID="1" presetClass="entr" presetSubtype="0" fill="hold" grpId="0" nodeType="withEffect">
+                                  <p:stCondLst>
+                                    <p:cond delay="0"/>
+                                  </p:stCondLst>
+                                  <p:childTnLst>
+                                    <p:set>
+                                      <p:cBhvr>
+                                        <p:cTn id="199" dur="1" fill="hold">
+                                          <p:stCondLst>
+                                            <p:cond delay="0"/>
+                                          </p:stCondLst>
+                                        </p:cTn>
+                                        <p:tgtEl>
+                                          <p:spTgt spid="64"/>
+                                        </p:tgtEl>
+                                        <p:attrNameLst>
+                                          <p:attrName>style.visibility</p:attrName>
+                                        </p:attrNameLst>
+                                      </p:cBhvr>
+                                      <p:to>
+                                        <p:strVal val="visible"/>
+                                      </p:to>
+                                    </p:set>
+                                  </p:childTnLst>
+                                  <p:subTnLst>
+                                    <p:set>
+                                      <p:cBhvr override="childStyle">
+                                        <p:cTn dur="1" fill="hold" display="0" masterRel="nextClick" afterEffect="1"/>
+                                        <p:tgtEl>
+                                          <p:spTgt spid="64"/>
+                                        </p:tgtEl>
+                                        <p:attrNameLst>
+                                          <p:attrName>style.visibility</p:attrName>
+                                        </p:attrNameLst>
+                                      </p:cBhvr>
+                                      <p:to>
+                                        <p:strVal val="hidden"/>
+                                      </p:to>
+                                    </p:set>
+                                  </p:subTnLst>
                                 </p:cTn>
                               </p:par>
                               <p:par>
@@ -45508,15 +45783,132 @@
                                   </p:childTnLst>
                                 </p:cTn>
                               </p:par>
+                            </p:childTnLst>
+                          </p:cTn>
+                        </p:par>
+                      </p:childTnLst>
+                    </p:cTn>
+                  </p:par>
+                  <p:par>
+                    <p:cTn id="212" fill="hold">
+                      <p:stCondLst>
+                        <p:cond delay="indefinite"/>
+                      </p:stCondLst>
+                      <p:childTnLst>
+                        <p:par>
+                          <p:cTn id="213" fill="hold">
+                            <p:stCondLst>
+                              <p:cond delay="0"/>
+                            </p:stCondLst>
+                            <p:childTnLst>
                               <p:par>
-                                <p:cTn id="212" presetID="10" presetClass="exit" presetSubtype="0" fill="hold" grpId="1" nodeType="withEffect">
+                                <p:cTn id="214" presetID="1" presetClass="entr" presetSubtype="0" fill="hold" nodeType="clickEffect">
+                                  <p:stCondLst>
+                                    <p:cond delay="0"/>
+                                  </p:stCondLst>
+                                  <p:childTnLst>
+                                    <p:set>
+                                      <p:cBhvr>
+                                        <p:cTn id="215" dur="1" fill="hold">
+                                          <p:stCondLst>
+                                            <p:cond delay="0"/>
+                                          </p:stCondLst>
+                                        </p:cTn>
+                                        <p:tgtEl>
+                                          <p:spTgt spid="1027"/>
+                                        </p:tgtEl>
+                                        <p:attrNameLst>
+                                          <p:attrName>style.visibility</p:attrName>
+                                        </p:attrNameLst>
+                                      </p:cBhvr>
+                                      <p:to>
+                                        <p:strVal val="visible"/>
+                                      </p:to>
+                                    </p:set>
+                                  </p:childTnLst>
+                                </p:cTn>
+                              </p:par>
+                              <p:par>
+                                <p:cTn id="216" presetID="1" presetClass="entr" presetSubtype="0" fill="hold" grpId="0" nodeType="withEffect">
+                                  <p:stCondLst>
+                                    <p:cond delay="0"/>
+                                  </p:stCondLst>
+                                  <p:childTnLst>
+                                    <p:set>
+                                      <p:cBhvr>
+                                        <p:cTn id="217" dur="1" fill="hold">
+                                          <p:stCondLst>
+                                            <p:cond delay="0"/>
+                                          </p:stCondLst>
+                                        </p:cTn>
+                                        <p:tgtEl>
+                                          <p:spTgt spid="65"/>
+                                        </p:tgtEl>
+                                        <p:attrNameLst>
+                                          <p:attrName>style.visibility</p:attrName>
+                                        </p:attrNameLst>
+                                      </p:cBhvr>
+                                      <p:to>
+                                        <p:strVal val="visible"/>
+                                      </p:to>
+                                    </p:set>
+                                  </p:childTnLst>
+                                </p:cTn>
+                              </p:par>
+                              <p:par>
+                                <p:cTn id="218" presetID="1" presetClass="entr" presetSubtype="0" fill="hold" grpId="0" nodeType="withEffect">
+                                  <p:stCondLst>
+                                    <p:cond delay="0"/>
+                                  </p:stCondLst>
+                                  <p:childTnLst>
+                                    <p:set>
+                                      <p:cBhvr>
+                                        <p:cTn id="219" dur="1" fill="hold">
+                                          <p:stCondLst>
+                                            <p:cond delay="0"/>
+                                          </p:stCondLst>
+                                        </p:cTn>
+                                        <p:tgtEl>
+                                          <p:spTgt spid="66"/>
+                                        </p:tgtEl>
+                                        <p:attrNameLst>
+                                          <p:attrName>style.visibility</p:attrName>
+                                        </p:attrNameLst>
+                                      </p:cBhvr>
+                                      <p:to>
+                                        <p:strVal val="visible"/>
+                                      </p:to>
+                                    </p:set>
+                                  </p:childTnLst>
+                                </p:cTn>
+                              </p:par>
+                            </p:childTnLst>
+                          </p:cTn>
+                        </p:par>
+                      </p:childTnLst>
+                    </p:cTn>
+                  </p:par>
+                  <p:par>
+                    <p:cTn id="220" fill="hold">
+                      <p:stCondLst>
+                        <p:cond delay="indefinite"/>
+                      </p:stCondLst>
+                      <p:childTnLst>
+                        <p:par>
+                          <p:cTn id="221" fill="hold">
+                            <p:stCondLst>
+                              <p:cond delay="0"/>
+                            </p:stCondLst>
+                            <p:childTnLst>
+                              <p:par>
+                                <p:cTn id="222" presetID="10" presetClass="exit" presetSubtype="0" fill="hold" grpId="1" nodeType="clickEffect">
                                   <p:stCondLst>
                                     <p:cond delay="0"/>
                                   </p:stCondLst>
                                   <p:childTnLst>
                                     <p:animEffect transition="out" filter="fade">
                                       <p:cBhvr>
-                                        <p:cTn id="213" dur="500"/>
+                                        <p:cTn id="223" dur="500"/>
                                         <p:tgtEl>
                                           <p:spTgt spid="54"/>
                                         </p:tgtEl>
@@ -45524,7 +45916,7 @@
                                     </p:animEffect>
                                     <p:set>
                                       <p:cBhvr>
-                                        <p:cTn id="214" dur="1" fill="hold">
+                                        <p:cTn id="224" dur="1" fill="hold">
                                           <p:stCondLst>
                                             <p:cond delay="499"/>
                                           </p:stCondLst>
@@ -45544,14 +45936,14 @@
                                 </p:cTn>
                               </p:par>
                               <p:par>
-                                <p:cTn id="215" presetID="10" presetClass="exit" presetSubtype="0" fill="hold" grpId="1" nodeType="withEffect">
+                                <p:cTn id="225" presetID="10" presetClass="exit" presetSubtype="0" fill="hold" grpId="1" nodeType="withEffect">
                                   <p:stCondLst>
                                     <p:cond delay="0"/>
                                   </p:stCondLst>
                                   <p:childTnLst>
                                     <p:animEffect transition="out" filter="fade">
                                       <p:cBhvr>
-                                        <p:cTn id="216" dur="500"/>
+                                        <p:cTn id="226" dur="500"/>
                                         <p:tgtEl>
                                           <p:spTgt spid="56"/>
                                         </p:tgtEl>
@@ -45559,7 +45951,7 @@
                                     </p:animEffect>
                                     <p:set>
                                       <p:cBhvr>
-                                        <p:cTn id="217" dur="1" fill="hold">
+                                        <p:cTn id="227" dur="1" fill="hold">
                                           <p:stCondLst>
                                             <p:cond delay="499"/>
                                           </p:stCondLst>
@@ -45579,14 +45971,14 @@
                                 </p:cTn>
                               </p:par>
                               <p:par>
-                                <p:cTn id="218" presetID="10" presetClass="exit" presetSubtype="0" fill="hold" grpId="1" nodeType="withEffect">
+                                <p:cTn id="228" presetID="10" presetClass="exit" presetSubtype="0" fill="hold" grpId="1" nodeType="withEffect">
                                   <p:stCondLst>
                                     <p:cond delay="0"/>
                                   </p:stCondLst>
                                   <p:childTnLst>
                                     <p:animEffect transition="out" filter="fade">
                                       <p:cBhvr>
-                                        <p:cTn id="219" dur="500"/>
+                                        <p:cTn id="229" dur="500"/>
                                         <p:tgtEl>
                                           <p:spTgt spid="53"/>
                                         </p:tgtEl>
@@ -45594,7 +45986,7 @@
                                     </p:animEffect>
                                     <p:set>
                                       <p:cBhvr>
-                                        <p:cTn id="220" dur="1" fill="hold">
+                                        <p:cTn id="230" dur="1" fill="hold">
                                           <p:stCondLst>
                                             <p:cond delay="499"/>
                                           </p:stCondLst>
@@ -45614,14 +46006,14 @@
                                 </p:cTn>
                               </p:par>
                               <p:par>
-                                <p:cTn id="221" presetID="10" presetClass="exit" presetSubtype="0" fill="hold" grpId="1" nodeType="withEffect">
+                                <p:cTn id="231" presetID="10" presetClass="exit" presetSubtype="0" fill="hold" grpId="1" nodeType="withEffect">
                                   <p:stCondLst>
                                     <p:cond delay="0"/>
                                   </p:stCondLst>
                                   <p:childTnLst>
                                     <p:animEffect transition="out" filter="fade">
                                       <p:cBhvr>
-                                        <p:cTn id="222" dur="500"/>
+                                        <p:cTn id="232" dur="500"/>
                                         <p:tgtEl>
                                           <p:spTgt spid="57"/>
                                         </p:tgtEl>
@@ -45629,7 +46021,7 @@
                                     </p:animEffect>
                                     <p:set>
                                       <p:cBhvr>
-                                        <p:cTn id="223" dur="1" fill="hold">
+                                        <p:cTn id="233" dur="1" fill="hold">
                                           <p:stCondLst>
                                             <p:cond delay="499"/>
                                           </p:stCondLst>
@@ -45649,14 +46041,14 @@
                                 </p:cTn>
                               </p:par>
                               <p:par>
-                                <p:cTn id="224" presetID="10" presetClass="exit" presetSubtype="0" fill="hold" grpId="1" nodeType="withEffect">
+                                <p:cTn id="234" presetID="10" presetClass="exit" presetSubtype="0" fill="hold" grpId="1" nodeType="withEffect">
                                   <p:stCondLst>
                                     <p:cond delay="0"/>
                                   </p:stCondLst>
                                   <p:childTnLst>
                                     <p:animEffect transition="out" filter="fade">
                                       <p:cBhvr>
-                                        <p:cTn id="225" dur="500"/>
+                                        <p:cTn id="235" dur="500"/>
                                         <p:tgtEl>
                                           <p:spTgt spid="55"/>
                                         </p:tgtEl>
@@ -45664,7 +46056,7 @@
                                     </p:animEffect>
                                     <p:set>
                                       <p:cBhvr>
-                                        <p:cTn id="226" dur="1" fill="hold">
+                                        <p:cTn id="236" dur="1" fill="hold">
                                           <p:stCondLst>
                                             <p:cond delay="499"/>
                                           </p:stCondLst>
@@ -45684,14 +46076,14 @@
                                 </p:cTn>
                               </p:par>
                               <p:par>
-                                <p:cTn id="227" presetID="10" presetClass="exit" presetSubtype="0" fill="hold" grpId="1" nodeType="withEffect">
+                                <p:cTn id="237" presetID="10" presetClass="exit" presetSubtype="0" fill="hold" grpId="1" nodeType="withEffect">
                                   <p:stCondLst>
                                     <p:cond delay="0"/>
                                   </p:stCondLst>
                                   <p:childTnLst>
                                     <p:animEffect transition="out" filter="fade">
                                       <p:cBhvr>
-                                        <p:cTn id="228" dur="500"/>
+                                        <p:cTn id="238" dur="500"/>
                                         <p:tgtEl>
                                           <p:spTgt spid="59"/>
                                         </p:tgtEl>
@@ -45699,7 +46091,7 @@
                                     </p:animEffect>
                                     <p:set>
                                       <p:cBhvr>
-                                        <p:cTn id="229" dur="1" fill="hold">
+                                        <p:cTn id="239" dur="1" fill="hold">
                                           <p:stCondLst>
                                             <p:cond delay="499"/>
                                           </p:stCondLst>
@@ -45719,14 +46111,14 @@
                                 </p:cTn>
                               </p:par>
                               <p:par>
-                                <p:cTn id="230" presetID="10" presetClass="exit" presetSubtype="0" fill="hold" grpId="1" nodeType="withEffect">
+                                <p:cTn id="240" presetID="10" presetClass="exit" presetSubtype="0" fill="hold" grpId="1" nodeType="withEffect">
                                   <p:stCondLst>
                                     <p:cond delay="0"/>
                                   </p:stCondLst>
                                   <p:childTnLst>
                                     <p:animEffect transition="out" filter="fade">
                                       <p:cBhvr>
-                                        <p:cTn id="231" dur="500"/>
+                                        <p:cTn id="241" dur="500"/>
                                         <p:tgtEl>
                                           <p:spTgt spid="58"/>
                                         </p:tgtEl>
@@ -45734,7 +46126,7 @@
                                     </p:animEffect>
                                     <p:set>
                                       <p:cBhvr>
-                                        <p:cTn id="232" dur="1" fill="hold">
+                                        <p:cTn id="242" dur="1" fill="hold">
                                           <p:stCondLst>
                                             <p:cond delay="499"/>
                                           </p:stCondLst>
@@ -45754,14 +46146,14 @@
                                 </p:cTn>
                               </p:par>
                               <p:par>
-                                <p:cTn id="233" presetID="10" presetClass="exit" presetSubtype="0" fill="hold" grpId="1" nodeType="withEffect">
+                                <p:cTn id="243" presetID="10" presetClass="exit" presetSubtype="0" fill="hold" grpId="1" nodeType="withEffect">
                                   <p:stCondLst>
                                     <p:cond delay="0"/>
                                   </p:stCondLst>
                                   <p:childTnLst>
                                     <p:animEffect transition="out" filter="fade">
                                       <p:cBhvr>
-                                        <p:cTn id="234" dur="500"/>
+                                        <p:cTn id="244" dur="500"/>
                                         <p:tgtEl>
                                           <p:spTgt spid="61"/>
                                         </p:tgtEl>
@@ -45769,13 +46161,83 @@
                                     </p:animEffect>
                                     <p:set>
                                       <p:cBhvr>
-                                        <p:cTn id="235" dur="1" fill="hold">
+                                        <p:cTn id="245" dur="1" fill="hold">
                                           <p:stCondLst>
                                             <p:cond delay="499"/>
                                           </p:stCondLst>
                                         </p:cTn>
                                         <p:tgtEl>
                                           <p:spTgt spid="61"/>
+                                        </p:tgtEl>
+                                        <p:attrNameLst>
+                                          <p:attrName>style.visibility</p:attrName>
+                                        </p:attrNameLst>
+                                      </p:cBhvr>
+                                      <p:to>
+                                        <p:strVal val="hidden"/>
+                                      </p:to>
+                                    </p:set>
+                                  </p:childTnLst>
+                                </p:cTn>
+                              </p:par>
+                              <p:par>
+                                <p:cTn id="246" presetID="10" presetClass="exit" presetSubtype="0" fill="hold" grpId="1" nodeType="withEffect">
+                                  <p:stCondLst>
+                                    <p:cond delay="0"/>
+                                  </p:stCondLst>
+                                  <p:childTnLst>
+                                    <p:animEffect transition="out" filter="fade">
+                                      <p:cBhvr>
+                                        <p:cTn id="247" dur="500"/>
+                                        <p:tgtEl>
+                                          <p:spTgt spid="65"/>
+                                        </p:tgtEl>
+                                      </p:cBhvr>
+                                    </p:animEffect>
+                                    <p:set>
+                                      <p:cBhvr>
+                                        <p:cTn id="248" dur="1" fill="hold">
+                                          <p:stCondLst>
+                                            <p:cond delay="499"/>
+                                          </p:stCondLst>
+                                        </p:cTn>
+                                        <p:tgtEl>
+                                          <p:spTgt spid="65"/>
+                                        </p:tgtEl>
+                                        <p:attrNameLst>
+                                          <p:attrName>style.visibility</p:attrName>
+                                        </p:attrNameLst>
+                                      </p:cBhvr>
+                                      <p:to>
+                                        <p:strVal val="hidden"/>
+                                      </p:to>
+                                    </p:set>
+                                  </p:childTnLst>
+                                </p:cTn>
+                              </p:par>
+                              <p:par>
+                                <p:cTn id="249" presetID="10" presetClass="exit" presetSubtype="0" fill="hold" grpId="1" nodeType="withEffect">
+                                  <p:stCondLst>
+                                    <p:cond delay="0"/>
+                                  </p:stCondLst>
+                                  <p:childTnLst>
+                                    <p:animEffect transition="out" filter="fade">
+                                      <p:cBhvr>
+                                        <p:cTn id="250" dur="500"/>
+                                        <p:tgtEl>
+                                          <p:spTgt spid="66"/>
+                                        </p:tgtEl>
+                                      </p:cBhvr>
+                                    </p:animEffect>
+                                    <p:set>
+                                      <p:cBhvr>
+                                        <p:cTn id="251" dur="1" fill="hold">
+                                          <p:stCondLst>
+                                            <p:cond delay="499"/>
+                                          </p:stCondLst>
+                                        </p:cTn>
+                                        <p:tgtEl>
+                                          <p:spTgt spid="66"/>
                                         </p:tgtEl>
                                         <p:attrNameLst>
                                           <p:attrName>style.visibility</p:attrName>
@@ -45880,6 +46342,11 @@
       <p:bldP spid="61" grpId="1" animBg="1"/>
       <p:bldP spid="62" grpId="0" animBg="1"/>
       <p:bldP spid="63" grpId="0" animBg="1"/>
+      <p:bldP spid="64" grpId="0" animBg="1"/>
+      <p:bldP spid="65" grpId="0" animBg="1"/>
+      <p:bldP spid="65" grpId="1" animBg="1"/>
+      <p:bldP spid="66" grpId="0" animBg="1"/>
+      <p:bldP spid="66" grpId="1" animBg="1"/>
     </p:bldLst>
   </p:timing>
 </p:sld>

</xml_diff>